<commit_message>
Presentation, Poster, and changes to scripts
</commit_message>
<xml_diff>
--- a/Deliverables/Presentation/Writing_Project_Presentation.pptx
+++ b/Deliverables/Presentation/Writing_Project_Presentation.pptx
@@ -4,16 +4,22 @@
   <p:sldMasterIdLst>
     <p:sldMasterId id="2147483672" r:id="rId4"/>
   </p:sldMasterIdLst>
+  <p:notesMasterIdLst>
+    <p:notesMasterId r:id="rId17"/>
+  </p:notesMasterIdLst>
   <p:sldIdLst>
     <p:sldId id="257" r:id="rId5"/>
-    <p:sldId id="258" r:id="rId6"/>
-    <p:sldId id="259" r:id="rId7"/>
-    <p:sldId id="261" r:id="rId8"/>
-    <p:sldId id="262" r:id="rId9"/>
-    <p:sldId id="263" r:id="rId10"/>
-    <p:sldId id="264" r:id="rId11"/>
-    <p:sldId id="265" r:id="rId12"/>
-    <p:sldId id="266" r:id="rId13"/>
+    <p:sldId id="269" r:id="rId6"/>
+    <p:sldId id="258" r:id="rId7"/>
+    <p:sldId id="259" r:id="rId8"/>
+    <p:sldId id="261" r:id="rId9"/>
+    <p:sldId id="262" r:id="rId10"/>
+    <p:sldId id="268" r:id="rId11"/>
+    <p:sldId id="263" r:id="rId12"/>
+    <p:sldId id="264" r:id="rId13"/>
+    <p:sldId id="265" r:id="rId14"/>
+    <p:sldId id="266" r:id="rId15"/>
+    <p:sldId id="267" r:id="rId16"/>
   </p:sldIdLst>
   <p:sldSz cx="9144000" cy="6858000" type="screen4x3"/>
   <p:notesSz cx="6858000" cy="9144000"/>
@@ -131,6 +137,535 @@
 </p:presentation>
 </file>
 
+<file path=ppt/notesMasters/notesMaster1.xml><?xml version="1.0" encoding="utf-8"?>
+<p:notesMaster xmlns:a="http://schemas.openxmlformats.org/drawingml/2006/main" xmlns:r="http://schemas.openxmlformats.org/officeDocument/2006/relationships" xmlns:p="http://schemas.openxmlformats.org/presentationml/2006/main">
+  <p:cSld>
+    <p:bg>
+      <p:bgRef idx="1001">
+        <a:schemeClr val="bg1"/>
+      </p:bgRef>
+    </p:bg>
+    <p:spTree>
+      <p:nvGrpSpPr>
+        <p:cNvPr id="1" name=""/>
+        <p:cNvGrpSpPr/>
+        <p:nvPr/>
+      </p:nvGrpSpPr>
+      <p:grpSpPr>
+        <a:xfrm>
+          <a:off x="0" y="0"/>
+          <a:ext cx="0" cy="0"/>
+          <a:chOff x="0" y="0"/>
+          <a:chExt cx="0" cy="0"/>
+        </a:xfrm>
+      </p:grpSpPr>
+      <p:sp>
+        <p:nvSpPr>
+          <p:cNvPr id="2" name="Header Placeholder 1"/>
+          <p:cNvSpPr>
+            <a:spLocks noGrp="1"/>
+          </p:cNvSpPr>
+          <p:nvPr>
+            <p:ph type="hdr" sz="quarter"/>
+          </p:nvPr>
+        </p:nvSpPr>
+        <p:spPr>
+          <a:xfrm>
+            <a:off x="0" y="0"/>
+            <a:ext cx="2971800" cy="458788"/>
+          </a:xfrm>
+          <a:prstGeom prst="rect">
+            <a:avLst/>
+          </a:prstGeom>
+        </p:spPr>
+        <p:txBody>
+          <a:bodyPr vert="horz" lIns="91440" tIns="45720" rIns="91440" bIns="45720" rtlCol="0"/>
+          <a:lstStyle>
+            <a:lvl1pPr algn="l">
+              <a:defRPr sz="1200"/>
+            </a:lvl1pPr>
+          </a:lstStyle>
+          <a:p>
+            <a:endParaRPr lang="en-US"/>
+          </a:p>
+        </p:txBody>
+      </p:sp>
+      <p:sp>
+        <p:nvSpPr>
+          <p:cNvPr id="3" name="Date Placeholder 2"/>
+          <p:cNvSpPr>
+            <a:spLocks noGrp="1"/>
+          </p:cNvSpPr>
+          <p:nvPr>
+            <p:ph type="dt" idx="1"/>
+          </p:nvPr>
+        </p:nvSpPr>
+        <p:spPr>
+          <a:xfrm>
+            <a:off x="3884613" y="0"/>
+            <a:ext cx="2971800" cy="458788"/>
+          </a:xfrm>
+          <a:prstGeom prst="rect">
+            <a:avLst/>
+          </a:prstGeom>
+        </p:spPr>
+        <p:txBody>
+          <a:bodyPr vert="horz" lIns="91440" tIns="45720" rIns="91440" bIns="45720" rtlCol="0"/>
+          <a:lstStyle>
+            <a:lvl1pPr algn="r">
+              <a:defRPr sz="1200"/>
+            </a:lvl1pPr>
+          </a:lstStyle>
+          <a:p>
+            <a:fld id="{7BCE2282-E3BC-46FF-84F2-CE6FEE4549E5}" type="datetimeFigureOut">
+              <a:rPr lang="en-US" smtClean="0"/>
+              <a:t>3/11/2024</a:t>
+            </a:fld>
+            <a:endParaRPr lang="en-US"/>
+          </a:p>
+        </p:txBody>
+      </p:sp>
+      <p:sp>
+        <p:nvSpPr>
+          <p:cNvPr id="4" name="Slide Image Placeholder 3"/>
+          <p:cNvSpPr>
+            <a:spLocks noGrp="1" noRot="1" noChangeAspect="1"/>
+          </p:cNvSpPr>
+          <p:nvPr>
+            <p:ph type="sldImg" idx="2"/>
+          </p:nvPr>
+        </p:nvSpPr>
+        <p:spPr>
+          <a:xfrm>
+            <a:off x="1371600" y="1143000"/>
+            <a:ext cx="4114800" cy="3086100"/>
+          </a:xfrm>
+          <a:prstGeom prst="rect">
+            <a:avLst/>
+          </a:prstGeom>
+          <a:noFill/>
+          <a:ln w="12700">
+            <a:solidFill>
+              <a:prstClr val="black"/>
+            </a:solidFill>
+          </a:ln>
+        </p:spPr>
+        <p:txBody>
+          <a:bodyPr vert="horz" lIns="91440" tIns="45720" rIns="91440" bIns="45720" rtlCol="0" anchor="ctr"/>
+          <a:lstStyle/>
+          <a:p>
+            <a:endParaRPr lang="en-US"/>
+          </a:p>
+        </p:txBody>
+      </p:sp>
+      <p:sp>
+        <p:nvSpPr>
+          <p:cNvPr id="5" name="Notes Placeholder 4"/>
+          <p:cNvSpPr>
+            <a:spLocks noGrp="1"/>
+          </p:cNvSpPr>
+          <p:nvPr>
+            <p:ph type="body" sz="quarter" idx="3"/>
+          </p:nvPr>
+        </p:nvSpPr>
+        <p:spPr>
+          <a:xfrm>
+            <a:off x="685800" y="4400550"/>
+            <a:ext cx="5486400" cy="3600450"/>
+          </a:xfrm>
+          <a:prstGeom prst="rect">
+            <a:avLst/>
+          </a:prstGeom>
+        </p:spPr>
+        <p:txBody>
+          <a:bodyPr vert="horz" lIns="91440" tIns="45720" rIns="91440" bIns="45720" rtlCol="0"/>
+          <a:lstStyle/>
+          <a:p>
+            <a:pPr lvl="0"/>
+            <a:r>
+              <a:rPr lang="en-US"/>
+              <a:t>Click to edit Master text styles</a:t>
+            </a:r>
+          </a:p>
+          <a:p>
+            <a:pPr lvl="1"/>
+            <a:r>
+              <a:rPr lang="en-US"/>
+              <a:t>Second level</a:t>
+            </a:r>
+          </a:p>
+          <a:p>
+            <a:pPr lvl="2"/>
+            <a:r>
+              <a:rPr lang="en-US"/>
+              <a:t>Third level</a:t>
+            </a:r>
+          </a:p>
+          <a:p>
+            <a:pPr lvl="3"/>
+            <a:r>
+              <a:rPr lang="en-US"/>
+              <a:t>Fourth level</a:t>
+            </a:r>
+          </a:p>
+          <a:p>
+            <a:pPr lvl="4"/>
+            <a:r>
+              <a:rPr lang="en-US"/>
+              <a:t>Fifth level</a:t>
+            </a:r>
+          </a:p>
+        </p:txBody>
+      </p:sp>
+      <p:sp>
+        <p:nvSpPr>
+          <p:cNvPr id="6" name="Footer Placeholder 5"/>
+          <p:cNvSpPr>
+            <a:spLocks noGrp="1"/>
+          </p:cNvSpPr>
+          <p:nvPr>
+            <p:ph type="ftr" sz="quarter" idx="4"/>
+          </p:nvPr>
+        </p:nvSpPr>
+        <p:spPr>
+          <a:xfrm>
+            <a:off x="0" y="8685213"/>
+            <a:ext cx="2971800" cy="458787"/>
+          </a:xfrm>
+          <a:prstGeom prst="rect">
+            <a:avLst/>
+          </a:prstGeom>
+        </p:spPr>
+        <p:txBody>
+          <a:bodyPr vert="horz" lIns="91440" tIns="45720" rIns="91440" bIns="45720" rtlCol="0" anchor="b"/>
+          <a:lstStyle>
+            <a:lvl1pPr algn="l">
+              <a:defRPr sz="1200"/>
+            </a:lvl1pPr>
+          </a:lstStyle>
+          <a:p>
+            <a:endParaRPr lang="en-US"/>
+          </a:p>
+        </p:txBody>
+      </p:sp>
+      <p:sp>
+        <p:nvSpPr>
+          <p:cNvPr id="7" name="Slide Number Placeholder 6"/>
+          <p:cNvSpPr>
+            <a:spLocks noGrp="1"/>
+          </p:cNvSpPr>
+          <p:nvPr>
+            <p:ph type="sldNum" sz="quarter" idx="5"/>
+          </p:nvPr>
+        </p:nvSpPr>
+        <p:spPr>
+          <a:xfrm>
+            <a:off x="3884613" y="8685213"/>
+            <a:ext cx="2971800" cy="458787"/>
+          </a:xfrm>
+          <a:prstGeom prst="rect">
+            <a:avLst/>
+          </a:prstGeom>
+        </p:spPr>
+        <p:txBody>
+          <a:bodyPr vert="horz" lIns="91440" tIns="45720" rIns="91440" bIns="45720" rtlCol="0" anchor="b"/>
+          <a:lstStyle>
+            <a:lvl1pPr algn="r">
+              <a:defRPr sz="1200"/>
+            </a:lvl1pPr>
+          </a:lstStyle>
+          <a:p>
+            <a:fld id="{9B13D50C-BE38-4177-8B7A-9C8012AE02CD}" type="slidenum">
+              <a:rPr lang="en-US" smtClean="0"/>
+              <a:t>‹#›</a:t>
+            </a:fld>
+            <a:endParaRPr lang="en-US"/>
+          </a:p>
+        </p:txBody>
+      </p:sp>
+    </p:spTree>
+    <p:extLst>
+      <p:ext uri="{BB962C8B-B14F-4D97-AF65-F5344CB8AC3E}">
+        <p14:creationId xmlns:p14="http://schemas.microsoft.com/office/powerpoint/2010/main" val="1092147854"/>
+      </p:ext>
+    </p:extLst>
+  </p:cSld>
+  <p:clrMap bg1="lt1" tx1="dk1" bg2="lt2" tx2="dk2" accent1="accent1" accent2="accent2" accent3="accent3" accent4="accent4" accent5="accent5" accent6="accent6" hlink="hlink" folHlink="folHlink"/>
+  <p:notesStyle>
+    <a:lvl1pPr marL="0" algn="l" defTabSz="914400" rtl="0" eaLnBrk="1" latinLnBrk="0" hangingPunct="1">
+      <a:defRPr sz="1200" kern="1200">
+        <a:solidFill>
+          <a:schemeClr val="tx1"/>
+        </a:solidFill>
+        <a:latin typeface="+mn-lt"/>
+        <a:ea typeface="+mn-ea"/>
+        <a:cs typeface="+mn-cs"/>
+      </a:defRPr>
+    </a:lvl1pPr>
+    <a:lvl2pPr marL="457200" algn="l" defTabSz="914400" rtl="0" eaLnBrk="1" latinLnBrk="0" hangingPunct="1">
+      <a:defRPr sz="1200" kern="1200">
+        <a:solidFill>
+          <a:schemeClr val="tx1"/>
+        </a:solidFill>
+        <a:latin typeface="+mn-lt"/>
+        <a:ea typeface="+mn-ea"/>
+        <a:cs typeface="+mn-cs"/>
+      </a:defRPr>
+    </a:lvl2pPr>
+    <a:lvl3pPr marL="914400" algn="l" defTabSz="914400" rtl="0" eaLnBrk="1" latinLnBrk="0" hangingPunct="1">
+      <a:defRPr sz="1200" kern="1200">
+        <a:solidFill>
+          <a:schemeClr val="tx1"/>
+        </a:solidFill>
+        <a:latin typeface="+mn-lt"/>
+        <a:ea typeface="+mn-ea"/>
+        <a:cs typeface="+mn-cs"/>
+      </a:defRPr>
+    </a:lvl3pPr>
+    <a:lvl4pPr marL="1371600" algn="l" defTabSz="914400" rtl="0" eaLnBrk="1" latinLnBrk="0" hangingPunct="1">
+      <a:defRPr sz="1200" kern="1200">
+        <a:solidFill>
+          <a:schemeClr val="tx1"/>
+        </a:solidFill>
+        <a:latin typeface="+mn-lt"/>
+        <a:ea typeface="+mn-ea"/>
+        <a:cs typeface="+mn-cs"/>
+      </a:defRPr>
+    </a:lvl4pPr>
+    <a:lvl5pPr marL="1828800" algn="l" defTabSz="914400" rtl="0" eaLnBrk="1" latinLnBrk="0" hangingPunct="1">
+      <a:defRPr sz="1200" kern="1200">
+        <a:solidFill>
+          <a:schemeClr val="tx1"/>
+        </a:solidFill>
+        <a:latin typeface="+mn-lt"/>
+        <a:ea typeface="+mn-ea"/>
+        <a:cs typeface="+mn-cs"/>
+      </a:defRPr>
+    </a:lvl5pPr>
+    <a:lvl6pPr marL="2286000" algn="l" defTabSz="914400" rtl="0" eaLnBrk="1" latinLnBrk="0" hangingPunct="1">
+      <a:defRPr sz="1200" kern="1200">
+        <a:solidFill>
+          <a:schemeClr val="tx1"/>
+        </a:solidFill>
+        <a:latin typeface="+mn-lt"/>
+        <a:ea typeface="+mn-ea"/>
+        <a:cs typeface="+mn-cs"/>
+      </a:defRPr>
+    </a:lvl6pPr>
+    <a:lvl7pPr marL="2743200" algn="l" defTabSz="914400" rtl="0" eaLnBrk="1" latinLnBrk="0" hangingPunct="1">
+      <a:defRPr sz="1200" kern="1200">
+        <a:solidFill>
+          <a:schemeClr val="tx1"/>
+        </a:solidFill>
+        <a:latin typeface="+mn-lt"/>
+        <a:ea typeface="+mn-ea"/>
+        <a:cs typeface="+mn-cs"/>
+      </a:defRPr>
+    </a:lvl7pPr>
+    <a:lvl8pPr marL="3200400" algn="l" defTabSz="914400" rtl="0" eaLnBrk="1" latinLnBrk="0" hangingPunct="1">
+      <a:defRPr sz="1200" kern="1200">
+        <a:solidFill>
+          <a:schemeClr val="tx1"/>
+        </a:solidFill>
+        <a:latin typeface="+mn-lt"/>
+        <a:ea typeface="+mn-ea"/>
+        <a:cs typeface="+mn-cs"/>
+      </a:defRPr>
+    </a:lvl8pPr>
+    <a:lvl9pPr marL="3657600" algn="l" defTabSz="914400" rtl="0" eaLnBrk="1" latinLnBrk="0" hangingPunct="1">
+      <a:defRPr sz="1200" kern="1200">
+        <a:solidFill>
+          <a:schemeClr val="tx1"/>
+        </a:solidFill>
+        <a:latin typeface="+mn-lt"/>
+        <a:ea typeface="+mn-ea"/>
+        <a:cs typeface="+mn-cs"/>
+      </a:defRPr>
+    </a:lvl9pPr>
+  </p:notesStyle>
+</p:notesMaster>
+</file>
+
+<file path=ppt/notesSlides/notesSlide1.xml><?xml version="1.0" encoding="utf-8"?>
+<p:notes xmlns:a="http://schemas.openxmlformats.org/drawingml/2006/main" xmlns:r="http://schemas.openxmlformats.org/officeDocument/2006/relationships" xmlns:p="http://schemas.openxmlformats.org/presentationml/2006/main">
+  <p:cSld>
+    <p:spTree>
+      <p:nvGrpSpPr>
+        <p:cNvPr id="1" name=""/>
+        <p:cNvGrpSpPr/>
+        <p:nvPr/>
+      </p:nvGrpSpPr>
+      <p:grpSpPr>
+        <a:xfrm>
+          <a:off x="0" y="0"/>
+          <a:ext cx="0" cy="0"/>
+          <a:chOff x="0" y="0"/>
+          <a:chExt cx="0" cy="0"/>
+        </a:xfrm>
+      </p:grpSpPr>
+      <p:sp>
+        <p:nvSpPr>
+          <p:cNvPr id="2" name="Slide Image Placeholder 1"/>
+          <p:cNvSpPr>
+            <a:spLocks noGrp="1" noRot="1" noChangeAspect="1"/>
+          </p:cNvSpPr>
+          <p:nvPr>
+            <p:ph type="sldImg"/>
+          </p:nvPr>
+        </p:nvSpPr>
+        <p:spPr/>
+      </p:sp>
+      <p:sp>
+        <p:nvSpPr>
+          <p:cNvPr id="3" name="Notes Placeholder 2"/>
+          <p:cNvSpPr>
+            <a:spLocks noGrp="1"/>
+          </p:cNvSpPr>
+          <p:nvPr>
+            <p:ph type="body" idx="1"/>
+          </p:nvPr>
+        </p:nvSpPr>
+        <p:spPr/>
+        <p:txBody>
+          <a:bodyPr/>
+          <a:lstStyle/>
+          <a:p>
+            <a:r>
+              <a:rPr lang="en-US" dirty="0"/>
+              <a:t>Add legend and axis labels to this plot</a:t>
+            </a:r>
+          </a:p>
+        </p:txBody>
+      </p:sp>
+      <p:sp>
+        <p:nvSpPr>
+          <p:cNvPr id="4" name="Slide Number Placeholder 3"/>
+          <p:cNvSpPr>
+            <a:spLocks noGrp="1"/>
+          </p:cNvSpPr>
+          <p:nvPr>
+            <p:ph type="sldNum" sz="quarter" idx="5"/>
+          </p:nvPr>
+        </p:nvSpPr>
+        <p:spPr/>
+        <p:txBody>
+          <a:bodyPr/>
+          <a:lstStyle/>
+          <a:p>
+            <a:fld id="{9B13D50C-BE38-4177-8B7A-9C8012AE02CD}" type="slidenum">
+              <a:rPr lang="en-US" smtClean="0"/>
+              <a:t>10</a:t>
+            </a:fld>
+            <a:endParaRPr lang="en-US"/>
+          </a:p>
+        </p:txBody>
+      </p:sp>
+    </p:spTree>
+    <p:extLst>
+      <p:ext uri="{BB962C8B-B14F-4D97-AF65-F5344CB8AC3E}">
+        <p14:creationId xmlns:p14="http://schemas.microsoft.com/office/powerpoint/2010/main" val="1673851611"/>
+      </p:ext>
+    </p:extLst>
+  </p:cSld>
+  <p:clrMapOvr>
+    <a:masterClrMapping/>
+  </p:clrMapOvr>
+</p:notes>
+</file>
+
+<file path=ppt/notesSlides/notesSlide2.xml><?xml version="1.0" encoding="utf-8"?>
+<p:notes xmlns:a="http://schemas.openxmlformats.org/drawingml/2006/main" xmlns:r="http://schemas.openxmlformats.org/officeDocument/2006/relationships" xmlns:p="http://schemas.openxmlformats.org/presentationml/2006/main">
+  <p:cSld>
+    <p:spTree>
+      <p:nvGrpSpPr>
+        <p:cNvPr id="1" name=""/>
+        <p:cNvGrpSpPr/>
+        <p:nvPr/>
+      </p:nvGrpSpPr>
+      <p:grpSpPr>
+        <a:xfrm>
+          <a:off x="0" y="0"/>
+          <a:ext cx="0" cy="0"/>
+          <a:chOff x="0" y="0"/>
+          <a:chExt cx="0" cy="0"/>
+        </a:xfrm>
+      </p:grpSpPr>
+      <p:sp>
+        <p:nvSpPr>
+          <p:cNvPr id="2" name="Slide Image Placeholder 1"/>
+          <p:cNvSpPr>
+            <a:spLocks noGrp="1" noRot="1" noChangeAspect="1"/>
+          </p:cNvSpPr>
+          <p:nvPr>
+            <p:ph type="sldImg"/>
+          </p:nvPr>
+        </p:nvSpPr>
+        <p:spPr/>
+      </p:sp>
+      <p:sp>
+        <p:nvSpPr>
+          <p:cNvPr id="3" name="Notes Placeholder 2"/>
+          <p:cNvSpPr>
+            <a:spLocks noGrp="1"/>
+          </p:cNvSpPr>
+          <p:nvPr>
+            <p:ph type="body" idx="1"/>
+          </p:nvPr>
+        </p:nvSpPr>
+        <p:spPr/>
+        <p:txBody>
+          <a:bodyPr/>
+          <a:lstStyle/>
+          <a:p>
+            <a:r>
+              <a:rPr lang="en-US" dirty="0"/>
+              <a:t>Cite paper John sent over for Bayesian Optimization</a:t>
+            </a:r>
+          </a:p>
+          <a:p>
+            <a:r>
+              <a:rPr lang="en-US" dirty="0"/>
+              <a:t>“Expository paper by …”</a:t>
+            </a:r>
+          </a:p>
+        </p:txBody>
+      </p:sp>
+      <p:sp>
+        <p:nvSpPr>
+          <p:cNvPr id="4" name="Slide Number Placeholder 3"/>
+          <p:cNvSpPr>
+            <a:spLocks noGrp="1"/>
+          </p:cNvSpPr>
+          <p:nvPr>
+            <p:ph type="sldNum" sz="quarter" idx="5"/>
+          </p:nvPr>
+        </p:nvSpPr>
+        <p:spPr/>
+        <p:txBody>
+          <a:bodyPr/>
+          <a:lstStyle/>
+          <a:p>
+            <a:fld id="{9B13D50C-BE38-4177-8B7A-9C8012AE02CD}" type="slidenum">
+              <a:rPr lang="en-US" smtClean="0"/>
+              <a:t>11</a:t>
+            </a:fld>
+            <a:endParaRPr lang="en-US"/>
+          </a:p>
+        </p:txBody>
+      </p:sp>
+    </p:spTree>
+    <p:extLst>
+      <p:ext uri="{BB962C8B-B14F-4D97-AF65-F5344CB8AC3E}">
+        <p14:creationId xmlns:p14="http://schemas.microsoft.com/office/powerpoint/2010/main" val="3652426930"/>
+      </p:ext>
+    </p:extLst>
+  </p:cSld>
+  <p:clrMapOvr>
+    <a:masterClrMapping/>
+  </p:clrMapOvr>
+</p:notes>
+</file>
+
 <file path=ppt/slideLayouts/slideLayout1.xml><?xml version="1.0" encoding="utf-8"?>
 <p:sldLayout xmlns:a="http://schemas.openxmlformats.org/drawingml/2006/main" xmlns:r="http://schemas.openxmlformats.org/officeDocument/2006/relationships" xmlns:p="http://schemas.openxmlformats.org/presentationml/2006/main" type="title" preserve="1">
   <p:cSld name="Title Slide">
@@ -316,7 +851,7 @@
           <a:p>
             <a:fld id="{07A9634C-365A-9845-9775-8941B6FBB9ED}" type="datetimeFigureOut">
               <a:rPr lang="en-US" smtClean="0"/>
-              <a:t>3/1/2024</a:t>
+              <a:t>3/11/2024</a:t>
             </a:fld>
             <a:endParaRPr lang="en-US"/>
           </a:p>
@@ -484,7 +1019,7 @@
           <a:p>
             <a:fld id="{07A9634C-365A-9845-9775-8941B6FBB9ED}" type="datetimeFigureOut">
               <a:rPr lang="en-US" smtClean="0"/>
-              <a:t>3/1/2024</a:t>
+              <a:t>3/11/2024</a:t>
             </a:fld>
             <a:endParaRPr lang="en-US"/>
           </a:p>
@@ -662,7 +1197,7 @@
           <a:p>
             <a:fld id="{07A9634C-365A-9845-9775-8941B6FBB9ED}" type="datetimeFigureOut">
               <a:rPr lang="en-US" smtClean="0"/>
-              <a:t>3/1/2024</a:t>
+              <a:t>3/11/2024</a:t>
             </a:fld>
             <a:endParaRPr lang="en-US"/>
           </a:p>
@@ -838,7 +1373,7 @@
           <a:p>
             <a:fld id="{07A9634C-365A-9845-9775-8941B6FBB9ED}" type="datetimeFigureOut">
               <a:rPr lang="en-US" smtClean="0"/>
-              <a:t>3/1/2024</a:t>
+              <a:t>3/11/2024</a:t>
             </a:fld>
             <a:endParaRPr lang="en-US"/>
           </a:p>
@@ -1083,7 +1618,7 @@
           <a:p>
             <a:fld id="{07A9634C-365A-9845-9775-8941B6FBB9ED}" type="datetimeFigureOut">
               <a:rPr lang="en-US" smtClean="0"/>
-              <a:t>3/1/2024</a:t>
+              <a:t>3/11/2024</a:t>
             </a:fld>
             <a:endParaRPr lang="en-US"/>
           </a:p>
@@ -1368,7 +1903,7 @@
           <a:p>
             <a:fld id="{07A9634C-365A-9845-9775-8941B6FBB9ED}" type="datetimeFigureOut">
               <a:rPr lang="en-US" smtClean="0"/>
-              <a:t>3/1/2024</a:t>
+              <a:t>3/11/2024</a:t>
             </a:fld>
             <a:endParaRPr lang="en-US"/>
           </a:p>
@@ -1787,7 +2322,7 @@
           <a:p>
             <a:fld id="{07A9634C-365A-9845-9775-8941B6FBB9ED}" type="datetimeFigureOut">
               <a:rPr lang="en-US" smtClean="0"/>
-              <a:t>3/1/2024</a:t>
+              <a:t>3/11/2024</a:t>
             </a:fld>
             <a:endParaRPr lang="en-US"/>
           </a:p>
@@ -1904,7 +2439,7 @@
           <a:p>
             <a:fld id="{07A9634C-365A-9845-9775-8941B6FBB9ED}" type="datetimeFigureOut">
               <a:rPr lang="en-US" smtClean="0"/>
-              <a:t>3/1/2024</a:t>
+              <a:t>3/11/2024</a:t>
             </a:fld>
             <a:endParaRPr lang="en-US"/>
           </a:p>
@@ -1999,7 +2534,7 @@
           <a:p>
             <a:fld id="{07A9634C-365A-9845-9775-8941B6FBB9ED}" type="datetimeFigureOut">
               <a:rPr lang="en-US" smtClean="0"/>
-              <a:t>3/1/2024</a:t>
+              <a:t>3/11/2024</a:t>
             </a:fld>
             <a:endParaRPr lang="en-US"/>
           </a:p>
@@ -2274,7 +2809,7 @@
           <a:p>
             <a:fld id="{07A9634C-365A-9845-9775-8941B6FBB9ED}" type="datetimeFigureOut">
               <a:rPr lang="en-US" smtClean="0"/>
-              <a:t>3/1/2024</a:t>
+              <a:t>3/11/2024</a:t>
             </a:fld>
             <a:endParaRPr lang="en-US"/>
           </a:p>
@@ -2526,7 +3061,7 @@
           <a:p>
             <a:fld id="{07A9634C-365A-9845-9775-8941B6FBB9ED}" type="datetimeFigureOut">
               <a:rPr lang="en-US" smtClean="0"/>
-              <a:t>3/1/2024</a:t>
+              <a:t>3/11/2024</a:t>
             </a:fld>
             <a:endParaRPr lang="en-US"/>
           </a:p>
@@ -2767,7 +3302,7 @@
           <a:p>
             <a:fld id="{07A9634C-365A-9845-9775-8941B6FBB9ED}" type="datetimeFigureOut">
               <a:rPr lang="en-US" smtClean="0"/>
-              <a:t>3/1/2024</a:t>
+              <a:t>3/11/2024</a:t>
             </a:fld>
             <a:endParaRPr lang="en-US"/>
           </a:p>
@@ -3201,6 +3736,688 @@
 </p:sld>
 </file>
 
+<file path=ppt/slides/slide10.xml><?xml version="1.0" encoding="utf-8"?>
+<p:sld xmlns:a="http://schemas.openxmlformats.org/drawingml/2006/main" xmlns:r="http://schemas.openxmlformats.org/officeDocument/2006/relationships" xmlns:p="http://schemas.openxmlformats.org/presentationml/2006/main">
+  <p:cSld>
+    <p:spTree>
+      <p:nvGrpSpPr>
+        <p:cNvPr id="1" name=""/>
+        <p:cNvGrpSpPr/>
+        <p:nvPr/>
+      </p:nvGrpSpPr>
+      <p:grpSpPr>
+        <a:xfrm>
+          <a:off x="0" y="0"/>
+          <a:ext cx="0" cy="0"/>
+          <a:chOff x="0" y="0"/>
+          <a:chExt cx="0" cy="0"/>
+        </a:xfrm>
+      </p:grpSpPr>
+      <p:sp>
+        <p:nvSpPr>
+          <p:cNvPr id="2" name="Title 1">
+            <a:extLst>
+              <a:ext uri="{FF2B5EF4-FFF2-40B4-BE49-F238E27FC236}">
+                <a16:creationId xmlns:a16="http://schemas.microsoft.com/office/drawing/2014/main" id="{F0E613A0-4843-2910-9703-B5D814E29B3B}"/>
+              </a:ext>
+            </a:extLst>
+          </p:cNvPr>
+          <p:cNvSpPr>
+            <a:spLocks noGrp="1"/>
+          </p:cNvSpPr>
+          <p:nvPr>
+            <p:ph type="title"/>
+          </p:nvPr>
+        </p:nvSpPr>
+        <p:spPr/>
+        <p:txBody>
+          <a:bodyPr/>
+          <a:lstStyle/>
+          <a:p>
+            <a:r>
+              <a:rPr lang="en-US" dirty="0"/>
+              <a:t>Results</a:t>
+            </a:r>
+          </a:p>
+        </p:txBody>
+      </p:sp>
+      <p:sp>
+        <p:nvSpPr>
+          <p:cNvPr id="3" name="Content Placeholder 2">
+            <a:extLst>
+              <a:ext uri="{FF2B5EF4-FFF2-40B4-BE49-F238E27FC236}">
+                <a16:creationId xmlns:a16="http://schemas.microsoft.com/office/drawing/2014/main" id="{767687C2-88D0-02FC-C076-38E474E7CBBF}"/>
+              </a:ext>
+            </a:extLst>
+          </p:cNvPr>
+          <p:cNvSpPr>
+            <a:spLocks noGrp="1"/>
+          </p:cNvSpPr>
+          <p:nvPr>
+            <p:ph idx="1"/>
+          </p:nvPr>
+        </p:nvSpPr>
+        <p:spPr>
+          <a:xfrm>
+            <a:off x="457200" y="1462742"/>
+            <a:ext cx="8229600" cy="1316318"/>
+          </a:xfrm>
+        </p:spPr>
+        <p:txBody>
+          <a:bodyPr/>
+          <a:lstStyle/>
+          <a:p>
+            <a:r>
+              <a:rPr lang="en-US" dirty="0"/>
+              <a:t>LSTM and ARIMA trained on data since 1995</a:t>
+            </a:r>
+          </a:p>
+          <a:p>
+            <a:pPr lvl="1"/>
+            <a:r>
+              <a:rPr lang="en-US" dirty="0"/>
+              <a:t>ARIMA: 1</a:t>
+            </a:r>
+            <a:r>
+              <a:rPr lang="en-US" baseline="30000" dirty="0"/>
+              <a:t>st</a:t>
+            </a:r>
+            <a:r>
+              <a:rPr lang="en-US" dirty="0"/>
+              <a:t> order AR, 4</a:t>
+            </a:r>
+            <a:r>
+              <a:rPr lang="en-US" baseline="30000" dirty="0"/>
+              <a:t>th</a:t>
+            </a:r>
+            <a:r>
+              <a:rPr lang="en-US" dirty="0"/>
+              <a:t> order MA</a:t>
+            </a:r>
+          </a:p>
+        </p:txBody>
+      </p:sp>
+      <p:pic>
+        <p:nvPicPr>
+          <p:cNvPr id="5" name="Picture 4">
+            <a:extLst>
+              <a:ext uri="{FF2B5EF4-FFF2-40B4-BE49-F238E27FC236}">
+                <a16:creationId xmlns:a16="http://schemas.microsoft.com/office/drawing/2014/main" id="{CC5F3F6D-D7E1-BC26-F7B8-B55F487EDD68}"/>
+              </a:ext>
+            </a:extLst>
+          </p:cNvPr>
+          <p:cNvPicPr>
+            <a:picLocks noChangeAspect="1"/>
+          </p:cNvPicPr>
+          <p:nvPr/>
+        </p:nvPicPr>
+        <p:blipFill>
+          <a:blip r:embed="rId3"/>
+          <a:srcRect/>
+          <a:stretch/>
+        </p:blipFill>
+        <p:spPr>
+          <a:xfrm>
+            <a:off x="1317809" y="2679700"/>
+            <a:ext cx="6508381" cy="3254190"/>
+          </a:xfrm>
+          <a:prstGeom prst="rect">
+            <a:avLst/>
+          </a:prstGeom>
+          <a:ln>
+            <a:solidFill>
+              <a:schemeClr val="tx1"/>
+            </a:solidFill>
+          </a:ln>
+        </p:spPr>
+      </p:pic>
+    </p:spTree>
+    <p:extLst>
+      <p:ext uri="{BB962C8B-B14F-4D97-AF65-F5344CB8AC3E}">
+        <p14:creationId xmlns:p14="http://schemas.microsoft.com/office/powerpoint/2010/main" val="3571052273"/>
+      </p:ext>
+    </p:extLst>
+  </p:cSld>
+  <p:clrMapOvr>
+    <a:masterClrMapping/>
+  </p:clrMapOvr>
+</p:sld>
+</file>
+
+<file path=ppt/slides/slide11.xml><?xml version="1.0" encoding="utf-8"?>
+<p:sld xmlns:a="http://schemas.openxmlformats.org/drawingml/2006/main" xmlns:r="http://schemas.openxmlformats.org/officeDocument/2006/relationships" xmlns:p="http://schemas.openxmlformats.org/presentationml/2006/main">
+  <p:cSld>
+    <p:spTree>
+      <p:nvGrpSpPr>
+        <p:cNvPr id="1" name=""/>
+        <p:cNvGrpSpPr/>
+        <p:nvPr/>
+      </p:nvGrpSpPr>
+      <p:grpSpPr>
+        <a:xfrm>
+          <a:off x="0" y="0"/>
+          <a:ext cx="0" cy="0"/>
+          <a:chOff x="0" y="0"/>
+          <a:chExt cx="0" cy="0"/>
+        </a:xfrm>
+      </p:grpSpPr>
+      <p:sp>
+        <p:nvSpPr>
+          <p:cNvPr id="2" name="Title 1">
+            <a:extLst>
+              <a:ext uri="{FF2B5EF4-FFF2-40B4-BE49-F238E27FC236}">
+                <a16:creationId xmlns:a16="http://schemas.microsoft.com/office/drawing/2014/main" id="{8B13FE03-F8E3-0EE0-62BF-C7513C592F04}"/>
+              </a:ext>
+            </a:extLst>
+          </p:cNvPr>
+          <p:cNvSpPr>
+            <a:spLocks noGrp="1"/>
+          </p:cNvSpPr>
+          <p:nvPr>
+            <p:ph type="title"/>
+          </p:nvPr>
+        </p:nvSpPr>
+        <p:spPr/>
+        <p:txBody>
+          <a:bodyPr/>
+          <a:lstStyle/>
+          <a:p>
+            <a:r>
+              <a:rPr lang="en-US" dirty="0"/>
+              <a:t>Next Steps</a:t>
+            </a:r>
+          </a:p>
+        </p:txBody>
+      </p:sp>
+      <p:sp>
+        <p:nvSpPr>
+          <p:cNvPr id="3" name="Content Placeholder 2">
+            <a:extLst>
+              <a:ext uri="{FF2B5EF4-FFF2-40B4-BE49-F238E27FC236}">
+                <a16:creationId xmlns:a16="http://schemas.microsoft.com/office/drawing/2014/main" id="{CF07C070-892C-9B18-DE90-6BA1ECD77F43}"/>
+              </a:ext>
+            </a:extLst>
+          </p:cNvPr>
+          <p:cNvSpPr>
+            <a:spLocks noGrp="1"/>
+          </p:cNvSpPr>
+          <p:nvPr>
+            <p:ph idx="1"/>
+          </p:nvPr>
+        </p:nvSpPr>
+        <p:spPr/>
+        <p:txBody>
+          <a:bodyPr>
+            <a:normAutofit fontScale="85000" lnSpcReduction="10000"/>
+          </a:bodyPr>
+          <a:lstStyle/>
+          <a:p>
+            <a:r>
+              <a:rPr lang="en-US" dirty="0"/>
+              <a:t>Bayesian Optimization for hyperparameter tuning</a:t>
+            </a:r>
+          </a:p>
+          <a:p>
+            <a:pPr lvl="1"/>
+            <a:r>
+              <a:rPr lang="en-US" dirty="0"/>
+              <a:t>Expository paper by </a:t>
+            </a:r>
+            <a:r>
+              <a:rPr lang="en-US" sz="2800" dirty="0">
+                <a:latin typeface="CMR12"/>
+              </a:rPr>
+              <a:t>Snoek, Larochelle, and Adams (2012)</a:t>
+            </a:r>
+            <a:endParaRPr lang="en-US" dirty="0"/>
+          </a:p>
+          <a:p>
+            <a:r>
+              <a:rPr lang="en-US" dirty="0"/>
+              <a:t>Compare to other methods</a:t>
+            </a:r>
+          </a:p>
+          <a:p>
+            <a:pPr lvl="1"/>
+            <a:r>
+              <a:rPr lang="en-US" dirty="0"/>
+              <a:t>Holt-Winters</a:t>
+            </a:r>
+          </a:p>
+          <a:p>
+            <a:pPr lvl="1"/>
+            <a:r>
+              <a:rPr lang="en-US" dirty="0"/>
+              <a:t>Exponential Smoothing</a:t>
+            </a:r>
+          </a:p>
+          <a:p>
+            <a:r>
+              <a:rPr lang="en-US" dirty="0"/>
+              <a:t>Obtain uncertainty intervals for LSTM predictions</a:t>
+            </a:r>
+          </a:p>
+          <a:p>
+            <a:pPr lvl="1"/>
+            <a:r>
+              <a:rPr lang="en-US" dirty="0"/>
+              <a:t>Bootstrap from training sample</a:t>
+            </a:r>
+          </a:p>
+          <a:p>
+            <a:pPr lvl="2"/>
+            <a:r>
+              <a:rPr lang="en-US" dirty="0"/>
+              <a:t>Bootstrap</a:t>
+            </a:r>
+          </a:p>
+          <a:p>
+            <a:pPr lvl="2"/>
+            <a:r>
+              <a:rPr lang="en-US" dirty="0"/>
+              <a:t>Retrain Network</a:t>
+            </a:r>
+          </a:p>
+          <a:p>
+            <a:pPr lvl="2"/>
+            <a:r>
+              <a:rPr lang="en-US" dirty="0"/>
+              <a:t>Obtain Predictions</a:t>
+            </a:r>
+          </a:p>
+          <a:p>
+            <a:pPr lvl="2"/>
+            <a:r>
+              <a:rPr lang="en-US" dirty="0"/>
+              <a:t>Repeat</a:t>
+            </a:r>
+          </a:p>
+        </p:txBody>
+      </p:sp>
+    </p:spTree>
+    <p:extLst>
+      <p:ext uri="{BB962C8B-B14F-4D97-AF65-F5344CB8AC3E}">
+        <p14:creationId xmlns:p14="http://schemas.microsoft.com/office/powerpoint/2010/main" val="730955719"/>
+      </p:ext>
+    </p:extLst>
+  </p:cSld>
+  <p:clrMapOvr>
+    <a:masterClrMapping/>
+  </p:clrMapOvr>
+</p:sld>
+</file>
+
+<file path=ppt/slides/slide12.xml><?xml version="1.0" encoding="utf-8"?>
+<p:sld xmlns:a="http://schemas.openxmlformats.org/drawingml/2006/main" xmlns:r="http://schemas.openxmlformats.org/officeDocument/2006/relationships" xmlns:p="http://schemas.openxmlformats.org/presentationml/2006/main">
+  <p:cSld>
+    <p:spTree>
+      <p:nvGrpSpPr>
+        <p:cNvPr id="1" name=""/>
+        <p:cNvGrpSpPr/>
+        <p:nvPr/>
+      </p:nvGrpSpPr>
+      <p:grpSpPr>
+        <a:xfrm>
+          <a:off x="0" y="0"/>
+          <a:ext cx="0" cy="0"/>
+          <a:chOff x="0" y="0"/>
+          <a:chExt cx="0" cy="0"/>
+        </a:xfrm>
+      </p:grpSpPr>
+      <p:sp>
+        <p:nvSpPr>
+          <p:cNvPr id="2" name="Title 1">
+            <a:extLst>
+              <a:ext uri="{FF2B5EF4-FFF2-40B4-BE49-F238E27FC236}">
+                <a16:creationId xmlns:a16="http://schemas.microsoft.com/office/drawing/2014/main" id="{9D0B6095-DBA1-3ED3-F9D2-FAC768515B03}"/>
+              </a:ext>
+            </a:extLst>
+          </p:cNvPr>
+          <p:cNvSpPr>
+            <a:spLocks noGrp="1"/>
+          </p:cNvSpPr>
+          <p:nvPr>
+            <p:ph type="title"/>
+          </p:nvPr>
+        </p:nvSpPr>
+        <p:spPr/>
+        <p:txBody>
+          <a:bodyPr/>
+          <a:lstStyle/>
+          <a:p>
+            <a:r>
+              <a:rPr lang="en-US" dirty="0"/>
+              <a:t>References</a:t>
+            </a:r>
+          </a:p>
+        </p:txBody>
+      </p:sp>
+      <p:sp>
+        <p:nvSpPr>
+          <p:cNvPr id="3" name="Content Placeholder 2">
+            <a:extLst>
+              <a:ext uri="{FF2B5EF4-FFF2-40B4-BE49-F238E27FC236}">
+                <a16:creationId xmlns:a16="http://schemas.microsoft.com/office/drawing/2014/main" id="{165D72E6-C6C7-C5C9-EEE7-006851A09B5A}"/>
+              </a:ext>
+            </a:extLst>
+          </p:cNvPr>
+          <p:cNvSpPr>
+            <a:spLocks noGrp="1"/>
+          </p:cNvSpPr>
+          <p:nvPr>
+            <p:ph idx="1"/>
+          </p:nvPr>
+        </p:nvSpPr>
+        <p:spPr/>
+        <p:txBody>
+          <a:bodyPr/>
+          <a:lstStyle/>
+          <a:p>
+            <a:pPr marL="0" indent="0">
+              <a:buNone/>
+            </a:pPr>
+            <a:r>
+              <a:rPr lang="en-US" sz="1800" b="0" i="0" u="none" strike="noStrike" baseline="0" dirty="0">
+                <a:latin typeface="CMR12"/>
+              </a:rPr>
+              <a:t>Ruiz, P. (2019). </a:t>
+            </a:r>
+            <a:r>
+              <a:rPr lang="en-US" sz="1800" b="0" i="1" u="none" strike="noStrike" baseline="0" dirty="0">
+                <a:latin typeface="CMR12"/>
+              </a:rPr>
+              <a:t>ML approaches for time series.</a:t>
+            </a:r>
+            <a:r>
+              <a:rPr lang="en-US" sz="1800" b="0" i="0" u="none" strike="noStrike" baseline="0" dirty="0">
+                <a:latin typeface="CMR12"/>
+              </a:rPr>
+              <a:t> </a:t>
+            </a:r>
+            <a:r>
+              <a:rPr lang="en-US" sz="1800" b="0" i="0" u="none" strike="noStrike" baseline="0" dirty="0">
+                <a:latin typeface="CMTI12"/>
+              </a:rPr>
+              <a:t>Medium</a:t>
+            </a:r>
+            <a:r>
+              <a:rPr lang="en-US" sz="1800" b="0" i="0" u="none" strike="noStrike" baseline="0" dirty="0">
+                <a:latin typeface="CMR12"/>
+              </a:rPr>
+              <a:t>.</a:t>
+            </a:r>
+          </a:p>
+          <a:p>
+            <a:pPr marL="0" indent="0" algn="l">
+              <a:buNone/>
+            </a:pPr>
+            <a:endParaRPr lang="en-US" sz="1800" b="0" i="0" u="none" strike="noStrike" baseline="0" dirty="0">
+              <a:latin typeface="CMR12"/>
+            </a:endParaRPr>
+          </a:p>
+          <a:p>
+            <a:pPr marL="0" indent="0" algn="l">
+              <a:buNone/>
+            </a:pPr>
+            <a:r>
+              <a:rPr lang="en-US" sz="1800" b="0" i="0" u="none" strike="noStrike" baseline="0" dirty="0" err="1">
+                <a:latin typeface="CMR12"/>
+              </a:rPr>
+              <a:t>Medsker</a:t>
+            </a:r>
+            <a:r>
+              <a:rPr lang="en-US" sz="1800" b="0" i="0" u="none" strike="noStrike" baseline="0" dirty="0">
+                <a:latin typeface="CMR12"/>
+              </a:rPr>
+              <a:t>, L. and Jain, L. C. (1999). </a:t>
+            </a:r>
+            <a:r>
+              <a:rPr lang="en-US" sz="1800" b="0" i="1" u="none" strike="noStrike" baseline="0" dirty="0">
+                <a:latin typeface="CMTI12"/>
+              </a:rPr>
+              <a:t>Recurrent neural networks: design and applications</a:t>
+            </a:r>
+            <a:r>
+              <a:rPr lang="en-US" sz="1800" b="0" i="1" u="none" strike="noStrike" baseline="0" dirty="0">
+                <a:latin typeface="CMR12"/>
+              </a:rPr>
+              <a:t>.</a:t>
+            </a:r>
+            <a:r>
+              <a:rPr lang="en-US" sz="1800" b="0" i="0" u="none" strike="noStrike" baseline="0" dirty="0">
+                <a:latin typeface="CMR12"/>
+              </a:rPr>
+              <a:t> CRC press.</a:t>
+            </a:r>
+          </a:p>
+          <a:p>
+            <a:pPr marL="0" indent="0" algn="l">
+              <a:buNone/>
+            </a:pPr>
+            <a:endParaRPr lang="en-US" sz="1800" dirty="0">
+              <a:latin typeface="CMR12"/>
+            </a:endParaRPr>
+          </a:p>
+          <a:p>
+            <a:pPr marL="0" indent="0" algn="l">
+              <a:buNone/>
+            </a:pPr>
+            <a:r>
+              <a:rPr lang="en-US" sz="1800" b="0" i="0" u="none" strike="noStrike" baseline="0" dirty="0">
+                <a:latin typeface="CMR12"/>
+              </a:rPr>
+              <a:t>Lim, B. and </a:t>
+            </a:r>
+            <a:r>
+              <a:rPr lang="en-US" sz="1800" b="0" i="0" u="none" strike="noStrike" baseline="0" dirty="0" err="1">
+                <a:latin typeface="CMR12"/>
+              </a:rPr>
+              <a:t>Zohren</a:t>
+            </a:r>
+            <a:r>
+              <a:rPr lang="en-US" sz="1800" b="0" i="0" u="none" strike="noStrike" baseline="0" dirty="0">
+                <a:latin typeface="CMR12"/>
+              </a:rPr>
+              <a:t>, S. (2021). </a:t>
+            </a:r>
+            <a:r>
+              <a:rPr lang="en-US" sz="1800" b="0" i="1" u="none" strike="noStrike" baseline="0" dirty="0">
+                <a:latin typeface="CMR12"/>
+              </a:rPr>
+              <a:t>Time-series forecasting with deep learning: a survey.</a:t>
+            </a:r>
+            <a:r>
+              <a:rPr lang="en-US" sz="1800" b="0" i="0" u="none" strike="noStrike" baseline="0" dirty="0">
+                <a:latin typeface="CMR12"/>
+              </a:rPr>
+              <a:t> </a:t>
+            </a:r>
+            <a:r>
+              <a:rPr lang="en-US" sz="1800" b="0" i="0" u="none" strike="noStrike" baseline="0" dirty="0">
+                <a:latin typeface="CMTI12"/>
+              </a:rPr>
+              <a:t>Philosophical Transactions of the Royal Society A</a:t>
+            </a:r>
+            <a:r>
+              <a:rPr lang="en-US" sz="1800" b="0" i="0" u="none" strike="noStrike" baseline="0" dirty="0">
+                <a:latin typeface="CMR12"/>
+              </a:rPr>
+              <a:t>, 379(2194):20200209.</a:t>
+            </a:r>
+          </a:p>
+          <a:p>
+            <a:pPr marL="0" indent="0" algn="l">
+              <a:buNone/>
+            </a:pPr>
+            <a:endParaRPr lang="en-US" sz="1800" dirty="0">
+              <a:latin typeface="CMR12"/>
+            </a:endParaRPr>
+          </a:p>
+          <a:p>
+            <a:pPr marL="0" indent="0" algn="l">
+              <a:buNone/>
+            </a:pPr>
+            <a:r>
+              <a:rPr lang="en-US" sz="1800" b="0" i="0" u="none" strike="noStrike" baseline="0" dirty="0" err="1">
+                <a:latin typeface="CMR12"/>
+              </a:rPr>
+              <a:t>Hebbar</a:t>
+            </a:r>
+            <a:r>
+              <a:rPr lang="en-US" sz="1800" b="0" i="0" u="none" strike="noStrike" baseline="0" dirty="0">
+                <a:latin typeface="CMR12"/>
+              </a:rPr>
+              <a:t>, N. (2021</a:t>
+            </a:r>
+            <a:r>
+              <a:rPr lang="en-US" sz="1800" b="0" u="none" strike="noStrike" baseline="0" dirty="0">
+                <a:latin typeface="CMR12"/>
+              </a:rPr>
+              <a:t>)</a:t>
+            </a:r>
+            <a:r>
+              <a:rPr lang="en-US" sz="1800" b="0" i="1" u="none" strike="noStrike" baseline="0" dirty="0">
+                <a:latin typeface="CMR12"/>
+              </a:rPr>
+              <a:t>. Time series forecasting with </a:t>
+            </a:r>
+            <a:r>
+              <a:rPr lang="en-US" sz="1800" b="0" i="1" u="none" strike="noStrike" baseline="0" dirty="0" err="1">
+                <a:latin typeface="CMR12"/>
+              </a:rPr>
+              <a:t>rnn</a:t>
+            </a:r>
+            <a:r>
+              <a:rPr lang="en-US" sz="1800" b="0" i="1" u="none" strike="noStrike" baseline="0" dirty="0">
+                <a:latin typeface="CMR12"/>
+              </a:rPr>
+              <a:t>(</a:t>
+            </a:r>
+            <a:r>
+              <a:rPr lang="en-US" sz="1800" b="0" i="1" u="none" strike="noStrike" baseline="0" dirty="0" err="1">
+                <a:latin typeface="CMR12"/>
+              </a:rPr>
+              <a:t>lstm</a:t>
+            </a:r>
+            <a:r>
+              <a:rPr lang="en-US" sz="1800" b="0" i="1" u="none" strike="noStrike" baseline="0" dirty="0">
+                <a:latin typeface="CMR12"/>
+              </a:rPr>
+              <a:t>)— complete python tutorial—</a:t>
+            </a:r>
+            <a:r>
+              <a:rPr lang="en-US" sz="1800" b="0" i="0" u="none" strike="noStrike" baseline="0" dirty="0">
+                <a:latin typeface="CMR12"/>
+              </a:rPr>
+              <a:t>.</a:t>
+            </a:r>
+          </a:p>
+          <a:p>
+            <a:pPr marL="0" indent="0" algn="l">
+              <a:buNone/>
+            </a:pPr>
+            <a:endParaRPr lang="en-US" sz="1800" dirty="0">
+              <a:latin typeface="CMR12"/>
+            </a:endParaRPr>
+          </a:p>
+          <a:p>
+            <a:pPr marL="0" indent="0" algn="l">
+              <a:buNone/>
+            </a:pPr>
+            <a:r>
+              <a:rPr lang="en-US" sz="1800" dirty="0">
+                <a:latin typeface="CMR12"/>
+              </a:rPr>
+              <a:t>Snoek, J., Larochelle, H., and Adams, R. P. (2012). Practical </a:t>
+            </a:r>
+            <a:r>
+              <a:rPr lang="en-US" sz="1800" dirty="0" err="1">
+                <a:latin typeface="CMR12"/>
+              </a:rPr>
+              <a:t>bayesian</a:t>
+            </a:r>
+            <a:r>
+              <a:rPr lang="en-US" sz="1800" dirty="0">
+                <a:latin typeface="CMR12"/>
+              </a:rPr>
+              <a:t> </a:t>
+            </a:r>
+            <a:r>
+              <a:rPr lang="en-US" sz="1800" dirty="0" err="1">
+                <a:latin typeface="CMR12"/>
+              </a:rPr>
+              <a:t>optimizationof</a:t>
+            </a:r>
+            <a:r>
+              <a:rPr lang="en-US" sz="1800" dirty="0">
+                <a:latin typeface="CMR12"/>
+              </a:rPr>
+              <a:t> machine learning algorithms. In Pereira, F., Burges, C., </a:t>
+            </a:r>
+            <a:r>
+              <a:rPr lang="en-US" sz="1800" dirty="0" err="1">
+                <a:latin typeface="CMR12"/>
+              </a:rPr>
+              <a:t>Bottou</a:t>
+            </a:r>
+            <a:r>
+              <a:rPr lang="en-US" sz="1800" dirty="0">
+                <a:latin typeface="CMR12"/>
+              </a:rPr>
+              <a:t>, L., </a:t>
+            </a:r>
+            <a:r>
+              <a:rPr lang="en-US" sz="1800" dirty="0" err="1">
+                <a:latin typeface="CMR12"/>
+              </a:rPr>
+              <a:t>andWeinberger</a:t>
+            </a:r>
+            <a:r>
+              <a:rPr lang="en-US" sz="1800" dirty="0">
+                <a:latin typeface="CMR12"/>
+              </a:rPr>
+              <a:t>, K., editors, </a:t>
+            </a:r>
+            <a:r>
+              <a:rPr lang="en-US" sz="1800" i="1" dirty="0">
+                <a:latin typeface="CMR12"/>
+              </a:rPr>
+              <a:t>Advances in Neural Information Processing </a:t>
+            </a:r>
+            <a:r>
+              <a:rPr lang="en-US" sz="1800" i="1" dirty="0" err="1">
+                <a:latin typeface="CMR12"/>
+              </a:rPr>
+              <a:t>Systems</a:t>
+            </a:r>
+            <a:r>
+              <a:rPr lang="en-US" sz="1800" dirty="0" err="1">
+                <a:latin typeface="CMR12"/>
+              </a:rPr>
+              <a:t>,volume</a:t>
+            </a:r>
+            <a:r>
+              <a:rPr lang="en-US" sz="1800" dirty="0">
+                <a:latin typeface="CMR12"/>
+              </a:rPr>
+              <a:t> 25. Curran Associates, Inc.</a:t>
+            </a:r>
+          </a:p>
+        </p:txBody>
+      </p:sp>
+    </p:spTree>
+    <p:extLst>
+      <p:ext uri="{BB962C8B-B14F-4D97-AF65-F5344CB8AC3E}">
+        <p14:creationId xmlns:p14="http://schemas.microsoft.com/office/powerpoint/2010/main" val="2260520938"/>
+      </p:ext>
+    </p:extLst>
+  </p:cSld>
+  <p:clrMapOvr>
+    <a:masterClrMapping/>
+  </p:clrMapOvr>
+</p:sld>
+</file>
+
 <file path=ppt/slides/slide2.xml><?xml version="1.0" encoding="utf-8"?>
 <p:sld xmlns:a="http://schemas.openxmlformats.org/drawingml/2006/main" xmlns:r="http://schemas.openxmlformats.org/officeDocument/2006/relationships" xmlns:p="http://schemas.openxmlformats.org/presentationml/2006/main">
   <p:cSld>
@@ -3220,6 +4437,126 @@
       </p:grpSpPr>
       <p:sp>
         <p:nvSpPr>
+          <p:cNvPr id="2" name="Title 1">
+            <a:extLst>
+              <a:ext uri="{FF2B5EF4-FFF2-40B4-BE49-F238E27FC236}">
+                <a16:creationId xmlns:a16="http://schemas.microsoft.com/office/drawing/2014/main" id="{12F51029-D698-816B-D234-4E3379004062}"/>
+              </a:ext>
+            </a:extLst>
+          </p:cNvPr>
+          <p:cNvSpPr>
+            <a:spLocks noGrp="1"/>
+          </p:cNvSpPr>
+          <p:nvPr>
+            <p:ph type="title"/>
+          </p:nvPr>
+        </p:nvSpPr>
+        <p:spPr/>
+        <p:txBody>
+          <a:bodyPr/>
+          <a:lstStyle/>
+          <a:p>
+            <a:r>
+              <a:rPr lang="en-US" dirty="0"/>
+              <a:t>Special Thanks</a:t>
+            </a:r>
+          </a:p>
+        </p:txBody>
+      </p:sp>
+      <p:sp>
+        <p:nvSpPr>
+          <p:cNvPr id="3" name="Content Placeholder 2">
+            <a:extLst>
+              <a:ext uri="{FF2B5EF4-FFF2-40B4-BE49-F238E27FC236}">
+                <a16:creationId xmlns:a16="http://schemas.microsoft.com/office/drawing/2014/main" id="{A22EF63C-2651-1145-B908-1A606709FC93}"/>
+              </a:ext>
+            </a:extLst>
+          </p:cNvPr>
+          <p:cNvSpPr>
+            <a:spLocks noGrp="1"/>
+          </p:cNvSpPr>
+          <p:nvPr>
+            <p:ph idx="1"/>
+          </p:nvPr>
+        </p:nvSpPr>
+        <p:spPr/>
+        <p:txBody>
+          <a:bodyPr/>
+          <a:lstStyle/>
+          <a:p>
+            <a:r>
+              <a:rPr lang="en-US" dirty="0"/>
+              <a:t>Project Advisor</a:t>
+            </a:r>
+          </a:p>
+          <a:p>
+            <a:pPr lvl="1"/>
+            <a:r>
+              <a:rPr lang="en-US" dirty="0"/>
+              <a:t>John Smith</a:t>
+            </a:r>
+          </a:p>
+          <a:p>
+            <a:r>
+              <a:rPr lang="en-US" dirty="0"/>
+              <a:t>Committee Members</a:t>
+            </a:r>
+          </a:p>
+          <a:p>
+            <a:pPr lvl="1"/>
+            <a:r>
+              <a:rPr lang="en-US" dirty="0"/>
+              <a:t>Samidha Shetty</a:t>
+            </a:r>
+          </a:p>
+          <a:p>
+            <a:pPr lvl="1"/>
+            <a:r>
+              <a:rPr lang="en-US" dirty="0"/>
+              <a:t>Scott McCalla</a:t>
+            </a:r>
+          </a:p>
+          <a:p>
+            <a:pPr lvl="1"/>
+            <a:r>
+              <a:rPr lang="en-US" dirty="0"/>
+              <a:t>Katharine Banner</a:t>
+            </a:r>
+          </a:p>
+        </p:txBody>
+      </p:sp>
+    </p:spTree>
+    <p:extLst>
+      <p:ext uri="{BB962C8B-B14F-4D97-AF65-F5344CB8AC3E}">
+        <p14:creationId xmlns:p14="http://schemas.microsoft.com/office/powerpoint/2010/main" val="2172137807"/>
+      </p:ext>
+    </p:extLst>
+  </p:cSld>
+  <p:clrMapOvr>
+    <a:masterClrMapping/>
+  </p:clrMapOvr>
+</p:sld>
+</file>
+
+<file path=ppt/slides/slide3.xml><?xml version="1.0" encoding="utf-8"?>
+<p:sld xmlns:a="http://schemas.openxmlformats.org/drawingml/2006/main" xmlns:r="http://schemas.openxmlformats.org/officeDocument/2006/relationships" xmlns:p="http://schemas.openxmlformats.org/presentationml/2006/main">
+  <p:cSld>
+    <p:spTree>
+      <p:nvGrpSpPr>
+        <p:cNvPr id="1" name=""/>
+        <p:cNvGrpSpPr/>
+        <p:nvPr/>
+      </p:nvGrpSpPr>
+      <p:grpSpPr>
+        <a:xfrm>
+          <a:off x="0" y="0"/>
+          <a:ext cx="0" cy="0"/>
+          <a:chOff x="0" y="0"/>
+          <a:chExt cx="0" cy="0"/>
+        </a:xfrm>
+      </p:grpSpPr>
+      <p:sp>
+        <p:nvSpPr>
           <p:cNvPr id="2" name="Title 1"/>
           <p:cNvSpPr>
             <a:spLocks noGrp="1"/>
@@ -3263,7 +4600,7 @@
           <a:p>
             <a:r>
               <a:rPr lang="en-US" dirty="0"/>
-              <a:t>Predictions have powerful implications</a:t>
+              <a:t>Predictions are frequently used in stakeholder decisions</a:t>
             </a:r>
           </a:p>
         </p:txBody>
@@ -3421,7 +4758,7 @@
 </p:sld>
 </file>
 
-<file path=ppt/slides/slide3.xml><?xml version="1.0" encoding="utf-8"?>
+<file path=ppt/slides/slide4.xml><?xml version="1.0" encoding="utf-8"?>
 <p:sld xmlns:a="http://schemas.openxmlformats.org/drawingml/2006/main" xmlns:r="http://schemas.openxmlformats.org/officeDocument/2006/relationships" xmlns:p="http://schemas.openxmlformats.org/presentationml/2006/main">
   <p:cSld>
     <p:spTree>
@@ -3527,7 +4864,7 @@
 </p:sld>
 </file>
 
-<file path=ppt/slides/slide4.xml><?xml version="1.0" encoding="utf-8"?>
+<file path=ppt/slides/slide5.xml><?xml version="1.0" encoding="utf-8"?>
 <p:sld xmlns:a="http://schemas.openxmlformats.org/drawingml/2006/main" xmlns:r="http://schemas.openxmlformats.org/officeDocument/2006/relationships" xmlns:p="http://schemas.openxmlformats.org/presentationml/2006/main">
   <p:cSld>
     <p:spTree>
@@ -3744,7 +5081,7 @@
 </p:sld>
 </file>
 
-<file path=ppt/slides/slide5.xml><?xml version="1.0" encoding="utf-8"?>
+<file path=ppt/slides/slide6.xml><?xml version="1.0" encoding="utf-8"?>
 <p:sld xmlns:a="http://schemas.openxmlformats.org/drawingml/2006/main" xmlns:r="http://schemas.openxmlformats.org/officeDocument/2006/relationships" xmlns:p="http://schemas.openxmlformats.org/presentationml/2006/main">
   <p:cSld>
     <p:spTree>
@@ -3917,7 +5254,135 @@
 </p:sld>
 </file>
 
-<file path=ppt/slides/slide6.xml><?xml version="1.0" encoding="utf-8"?>
+<file path=ppt/slides/slide7.xml><?xml version="1.0" encoding="utf-8"?>
+<p:sld xmlns:a="http://schemas.openxmlformats.org/drawingml/2006/main" xmlns:r="http://schemas.openxmlformats.org/officeDocument/2006/relationships" xmlns:p="http://schemas.openxmlformats.org/presentationml/2006/main">
+  <p:cSld>
+    <p:spTree>
+      <p:nvGrpSpPr>
+        <p:cNvPr id="1" name=""/>
+        <p:cNvGrpSpPr/>
+        <p:nvPr/>
+      </p:nvGrpSpPr>
+      <p:grpSpPr>
+        <a:xfrm>
+          <a:off x="0" y="0"/>
+          <a:ext cx="0" cy="0"/>
+          <a:chOff x="0" y="0"/>
+          <a:chExt cx="0" cy="0"/>
+        </a:xfrm>
+      </p:grpSpPr>
+      <p:sp>
+        <p:nvSpPr>
+          <p:cNvPr id="5" name="Title 4">
+            <a:extLst>
+              <a:ext uri="{FF2B5EF4-FFF2-40B4-BE49-F238E27FC236}">
+                <a16:creationId xmlns:a16="http://schemas.microsoft.com/office/drawing/2014/main" id="{9CDE2CCB-A79B-8897-27F7-CACE7661A625}"/>
+              </a:ext>
+            </a:extLst>
+          </p:cNvPr>
+          <p:cNvSpPr>
+            <a:spLocks noGrp="1"/>
+          </p:cNvSpPr>
+          <p:nvPr>
+            <p:ph type="title"/>
+          </p:nvPr>
+        </p:nvSpPr>
+        <p:spPr/>
+        <p:txBody>
+          <a:bodyPr/>
+          <a:lstStyle/>
+          <a:p>
+            <a:r>
+              <a:rPr lang="en-US" dirty="0"/>
+              <a:t>Motivation</a:t>
+            </a:r>
+          </a:p>
+        </p:txBody>
+      </p:sp>
+      <p:sp>
+        <p:nvSpPr>
+          <p:cNvPr id="6" name="Content Placeholder 5">
+            <a:extLst>
+              <a:ext uri="{FF2B5EF4-FFF2-40B4-BE49-F238E27FC236}">
+                <a16:creationId xmlns:a16="http://schemas.microsoft.com/office/drawing/2014/main" id="{D5870858-9CB8-E218-E2C1-7DB554BDE843}"/>
+              </a:ext>
+            </a:extLst>
+          </p:cNvPr>
+          <p:cNvSpPr>
+            <a:spLocks noGrp="1"/>
+          </p:cNvSpPr>
+          <p:nvPr>
+            <p:ph idx="1"/>
+          </p:nvPr>
+        </p:nvSpPr>
+        <p:spPr/>
+        <p:txBody>
+          <a:bodyPr/>
+          <a:lstStyle/>
+          <a:p>
+            <a:r>
+              <a:rPr lang="en-US" dirty="0"/>
+              <a:t>Predict water depth for future dates</a:t>
+            </a:r>
+          </a:p>
+          <a:p>
+            <a:pPr lvl="1"/>
+            <a:r>
+              <a:rPr lang="en-US" dirty="0"/>
+              <a:t>Comparison of Predictions and Observations allow for potential problems to be caught early</a:t>
+            </a:r>
+          </a:p>
+          <a:p>
+            <a:r>
+              <a:rPr lang="en-US" dirty="0"/>
+              <a:t>Explore non-traditional methods for time-series forecasting</a:t>
+            </a:r>
+          </a:p>
+        </p:txBody>
+      </p:sp>
+      <p:pic>
+        <p:nvPicPr>
+          <p:cNvPr id="10" name="Picture 9" descr="A map of land with different colored triangles&#10;&#10;Description automatically generated">
+            <a:extLst>
+              <a:ext uri="{FF2B5EF4-FFF2-40B4-BE49-F238E27FC236}">
+                <a16:creationId xmlns:a16="http://schemas.microsoft.com/office/drawing/2014/main" id="{39859CE4-C87A-6CD9-415D-28DFE21BF322}"/>
+              </a:ext>
+            </a:extLst>
+          </p:cNvPr>
+          <p:cNvPicPr>
+            <a:picLocks noChangeAspect="1"/>
+          </p:cNvPicPr>
+          <p:nvPr/>
+        </p:nvPicPr>
+        <p:blipFill rotWithShape="1">
+          <a:blip r:embed="rId2"/>
+          <a:srcRect r="25186"/>
+          <a:stretch/>
+        </p:blipFill>
+        <p:spPr>
+          <a:xfrm>
+            <a:off x="4530159" y="3633694"/>
+            <a:ext cx="2402547" cy="2408518"/>
+          </a:xfrm>
+          <a:prstGeom prst="rect">
+            <a:avLst/>
+          </a:prstGeom>
+        </p:spPr>
+      </p:pic>
+    </p:spTree>
+    <p:extLst>
+      <p:ext uri="{BB962C8B-B14F-4D97-AF65-F5344CB8AC3E}">
+        <p14:creationId xmlns:p14="http://schemas.microsoft.com/office/powerpoint/2010/main" val="4214772279"/>
+      </p:ext>
+    </p:extLst>
+  </p:cSld>
+  <p:clrMapOvr>
+    <a:masterClrMapping/>
+  </p:clrMapOvr>
+</p:sld>
+</file>
+
+<file path=ppt/slides/slide8.xml><?xml version="1.0" encoding="utf-8"?>
 <p:sld xmlns:a="http://schemas.openxmlformats.org/drawingml/2006/main" xmlns:r="http://schemas.openxmlformats.org/officeDocument/2006/relationships" xmlns:p="http://schemas.openxmlformats.org/presentationml/2006/main">
   <p:cSld>
     <p:spTree>
@@ -4079,7 +5544,7 @@
 </p:sld>
 </file>
 
-<file path=ppt/slides/slide7.xml><?xml version="1.0" encoding="utf-8"?>
+<file path=ppt/slides/slide9.xml><?xml version="1.0" encoding="utf-8"?>
 <p:sld xmlns:a="http://schemas.openxmlformats.org/drawingml/2006/main" xmlns:r="http://schemas.openxmlformats.org/officeDocument/2006/relationships" xmlns:p="http://schemas.openxmlformats.org/presentationml/2006/main">
   <p:cSld>
     <p:spTree>
@@ -4215,311 +5680,6 @@
     <p:extLst>
       <p:ext uri="{BB962C8B-B14F-4D97-AF65-F5344CB8AC3E}">
         <p14:creationId xmlns:p14="http://schemas.microsoft.com/office/powerpoint/2010/main" val="3550580963"/>
-      </p:ext>
-    </p:extLst>
-  </p:cSld>
-  <p:clrMapOvr>
-    <a:masterClrMapping/>
-  </p:clrMapOvr>
-</p:sld>
-</file>
-
-<file path=ppt/slides/slide8.xml><?xml version="1.0" encoding="utf-8"?>
-<p:sld xmlns:a="http://schemas.openxmlformats.org/drawingml/2006/main" xmlns:r="http://schemas.openxmlformats.org/officeDocument/2006/relationships" xmlns:p="http://schemas.openxmlformats.org/presentationml/2006/main">
-  <p:cSld>
-    <p:spTree>
-      <p:nvGrpSpPr>
-        <p:cNvPr id="1" name=""/>
-        <p:cNvGrpSpPr/>
-        <p:nvPr/>
-      </p:nvGrpSpPr>
-      <p:grpSpPr>
-        <a:xfrm>
-          <a:off x="0" y="0"/>
-          <a:ext cx="0" cy="0"/>
-          <a:chOff x="0" y="0"/>
-          <a:chExt cx="0" cy="0"/>
-        </a:xfrm>
-      </p:grpSpPr>
-      <p:sp>
-        <p:nvSpPr>
-          <p:cNvPr id="2" name="Title 1">
-            <a:extLst>
-              <a:ext uri="{FF2B5EF4-FFF2-40B4-BE49-F238E27FC236}">
-                <a16:creationId xmlns:a16="http://schemas.microsoft.com/office/drawing/2014/main" id="{F0E613A0-4843-2910-9703-B5D814E29B3B}"/>
-              </a:ext>
-            </a:extLst>
-          </p:cNvPr>
-          <p:cNvSpPr>
-            <a:spLocks noGrp="1"/>
-          </p:cNvSpPr>
-          <p:nvPr>
-            <p:ph type="title"/>
-          </p:nvPr>
-        </p:nvSpPr>
-        <p:spPr/>
-        <p:txBody>
-          <a:bodyPr/>
-          <a:lstStyle/>
-          <a:p>
-            <a:r>
-              <a:rPr lang="en-US" dirty="0"/>
-              <a:t>Results</a:t>
-            </a:r>
-          </a:p>
-        </p:txBody>
-      </p:sp>
-      <p:sp>
-        <p:nvSpPr>
-          <p:cNvPr id="3" name="Content Placeholder 2">
-            <a:extLst>
-              <a:ext uri="{FF2B5EF4-FFF2-40B4-BE49-F238E27FC236}">
-                <a16:creationId xmlns:a16="http://schemas.microsoft.com/office/drawing/2014/main" id="{767687C2-88D0-02FC-C076-38E474E7CBBF}"/>
-              </a:ext>
-            </a:extLst>
-          </p:cNvPr>
-          <p:cNvSpPr>
-            <a:spLocks noGrp="1"/>
-          </p:cNvSpPr>
-          <p:nvPr>
-            <p:ph idx="1"/>
-          </p:nvPr>
-        </p:nvSpPr>
-        <p:spPr>
-          <a:xfrm>
-            <a:off x="457200" y="1462742"/>
-            <a:ext cx="8229600" cy="1316318"/>
-          </a:xfrm>
-        </p:spPr>
-        <p:txBody>
-          <a:bodyPr/>
-          <a:lstStyle/>
-          <a:p>
-            <a:r>
-              <a:rPr lang="en-US" dirty="0"/>
-              <a:t>LSTM and ARIMA trained on data since 1995</a:t>
-            </a:r>
-          </a:p>
-          <a:p>
-            <a:pPr lvl="1"/>
-            <a:r>
-              <a:rPr lang="en-US" dirty="0"/>
-              <a:t>ARIMA: 1</a:t>
-            </a:r>
-            <a:r>
-              <a:rPr lang="en-US" baseline="30000" dirty="0"/>
-              <a:t>st</a:t>
-            </a:r>
-            <a:r>
-              <a:rPr lang="en-US" dirty="0"/>
-              <a:t> order AR, 3</a:t>
-            </a:r>
-            <a:r>
-              <a:rPr lang="en-US" baseline="30000" dirty="0"/>
-              <a:t>rd</a:t>
-            </a:r>
-            <a:r>
-              <a:rPr lang="en-US" dirty="0"/>
-              <a:t> order MA</a:t>
-            </a:r>
-          </a:p>
-        </p:txBody>
-      </p:sp>
-      <p:pic>
-        <p:nvPicPr>
-          <p:cNvPr id="5" name="Picture 4" descr="A graph with a line and a red line&#10;&#10;Description automatically generated">
-            <a:extLst>
-              <a:ext uri="{FF2B5EF4-FFF2-40B4-BE49-F238E27FC236}">
-                <a16:creationId xmlns:a16="http://schemas.microsoft.com/office/drawing/2014/main" id="{CC5F3F6D-D7E1-BC26-F7B8-B55F487EDD68}"/>
-              </a:ext>
-            </a:extLst>
-          </p:cNvPr>
-          <p:cNvPicPr>
-            <a:picLocks noChangeAspect="1"/>
-          </p:cNvPicPr>
-          <p:nvPr/>
-        </p:nvPicPr>
-        <p:blipFill>
-          <a:blip r:embed="rId2"/>
-          <a:stretch>
-            <a:fillRect/>
-          </a:stretch>
-        </p:blipFill>
-        <p:spPr>
-          <a:xfrm>
-            <a:off x="2352933" y="2677458"/>
-            <a:ext cx="4438133" cy="3328600"/>
-          </a:xfrm>
-          <a:prstGeom prst="rect">
-            <a:avLst/>
-          </a:prstGeom>
-          <a:ln>
-            <a:solidFill>
-              <a:schemeClr val="tx1"/>
-            </a:solidFill>
-          </a:ln>
-        </p:spPr>
-      </p:pic>
-    </p:spTree>
-    <p:extLst>
-      <p:ext uri="{BB962C8B-B14F-4D97-AF65-F5344CB8AC3E}">
-        <p14:creationId xmlns:p14="http://schemas.microsoft.com/office/powerpoint/2010/main" val="3571052273"/>
-      </p:ext>
-    </p:extLst>
-  </p:cSld>
-  <p:clrMapOvr>
-    <a:masterClrMapping/>
-  </p:clrMapOvr>
-</p:sld>
-</file>
-
-<file path=ppt/slides/slide9.xml><?xml version="1.0" encoding="utf-8"?>
-<p:sld xmlns:a="http://schemas.openxmlformats.org/drawingml/2006/main" xmlns:r="http://schemas.openxmlformats.org/officeDocument/2006/relationships" xmlns:p="http://schemas.openxmlformats.org/presentationml/2006/main">
-  <p:cSld>
-    <p:spTree>
-      <p:nvGrpSpPr>
-        <p:cNvPr id="1" name=""/>
-        <p:cNvGrpSpPr/>
-        <p:nvPr/>
-      </p:nvGrpSpPr>
-      <p:grpSpPr>
-        <a:xfrm>
-          <a:off x="0" y="0"/>
-          <a:ext cx="0" cy="0"/>
-          <a:chOff x="0" y="0"/>
-          <a:chExt cx="0" cy="0"/>
-        </a:xfrm>
-      </p:grpSpPr>
-      <p:sp>
-        <p:nvSpPr>
-          <p:cNvPr id="2" name="Title 1">
-            <a:extLst>
-              <a:ext uri="{FF2B5EF4-FFF2-40B4-BE49-F238E27FC236}">
-                <a16:creationId xmlns:a16="http://schemas.microsoft.com/office/drawing/2014/main" id="{8B13FE03-F8E3-0EE0-62BF-C7513C592F04}"/>
-              </a:ext>
-            </a:extLst>
-          </p:cNvPr>
-          <p:cNvSpPr>
-            <a:spLocks noGrp="1"/>
-          </p:cNvSpPr>
-          <p:nvPr>
-            <p:ph type="title"/>
-          </p:nvPr>
-        </p:nvSpPr>
-        <p:spPr/>
-        <p:txBody>
-          <a:bodyPr/>
-          <a:lstStyle/>
-          <a:p>
-            <a:r>
-              <a:rPr lang="en-US" dirty="0"/>
-              <a:t>Next Steps</a:t>
-            </a:r>
-          </a:p>
-        </p:txBody>
-      </p:sp>
-      <p:sp>
-        <p:nvSpPr>
-          <p:cNvPr id="3" name="Content Placeholder 2">
-            <a:extLst>
-              <a:ext uri="{FF2B5EF4-FFF2-40B4-BE49-F238E27FC236}">
-                <a16:creationId xmlns:a16="http://schemas.microsoft.com/office/drawing/2014/main" id="{CF07C070-892C-9B18-DE90-6BA1ECD77F43}"/>
-              </a:ext>
-            </a:extLst>
-          </p:cNvPr>
-          <p:cNvSpPr>
-            <a:spLocks noGrp="1"/>
-          </p:cNvSpPr>
-          <p:nvPr>
-            <p:ph idx="1"/>
-          </p:nvPr>
-        </p:nvSpPr>
-        <p:spPr/>
-        <p:txBody>
-          <a:bodyPr>
-            <a:normAutofit fontScale="92500" lnSpcReduction="20000"/>
-          </a:bodyPr>
-          <a:lstStyle/>
-          <a:p>
-            <a:r>
-              <a:rPr lang="en-US" dirty="0"/>
-              <a:t>Bayesian Optimization for hyperparameter tuning</a:t>
-            </a:r>
-          </a:p>
-          <a:p>
-            <a:pPr lvl="1"/>
-            <a:r>
-              <a:rPr lang="en-US" dirty="0"/>
-              <a:t>Ideal architecture?</a:t>
-            </a:r>
-          </a:p>
-          <a:p>
-            <a:r>
-              <a:rPr lang="en-US" dirty="0"/>
-              <a:t>Compare to other methods</a:t>
-            </a:r>
-          </a:p>
-          <a:p>
-            <a:pPr lvl="1"/>
-            <a:r>
-              <a:rPr lang="en-US" dirty="0"/>
-              <a:t>Holt-Winters</a:t>
-            </a:r>
-          </a:p>
-          <a:p>
-            <a:pPr lvl="1"/>
-            <a:r>
-              <a:rPr lang="en-US" dirty="0"/>
-              <a:t>Exponential Smoothing</a:t>
-            </a:r>
-          </a:p>
-          <a:p>
-            <a:r>
-              <a:rPr lang="en-US" dirty="0"/>
-              <a:t>Obtain uncertainty intervals for LSTM predictions</a:t>
-            </a:r>
-          </a:p>
-          <a:p>
-            <a:pPr lvl="1"/>
-            <a:r>
-              <a:rPr lang="en-US" dirty="0"/>
-              <a:t>Bootstrap from training sample</a:t>
-            </a:r>
-          </a:p>
-          <a:p>
-            <a:pPr lvl="2"/>
-            <a:r>
-              <a:rPr lang="en-US" dirty="0"/>
-              <a:t>Bootstrap</a:t>
-            </a:r>
-          </a:p>
-          <a:p>
-            <a:pPr lvl="2"/>
-            <a:r>
-              <a:rPr lang="en-US" dirty="0"/>
-              <a:t>Retrain Network</a:t>
-            </a:r>
-          </a:p>
-          <a:p>
-            <a:pPr lvl="2"/>
-            <a:r>
-              <a:rPr lang="en-US" dirty="0"/>
-              <a:t>Obtain Predictions</a:t>
-            </a:r>
-          </a:p>
-          <a:p>
-            <a:pPr lvl="2"/>
-            <a:r>
-              <a:rPr lang="en-US" dirty="0"/>
-              <a:t>Repeat</a:t>
-            </a:r>
-          </a:p>
-        </p:txBody>
-      </p:sp>
-    </p:spTree>
-    <p:extLst>
-      <p:ext uri="{BB962C8B-B14F-4D97-AF65-F5344CB8AC3E}">
-        <p14:creationId xmlns:p14="http://schemas.microsoft.com/office/powerpoint/2010/main" val="730955719"/>
       </p:ext>
     </p:extLst>
   </p:cSld>
@@ -4849,27 +6009,322 @@
 </a:theme>
 </file>
 
-<file path=customXml/item1.xml><?xml version="1.0" encoding="utf-8"?>
-<?mso-contentType ?>
-<FormTemplates xmlns="http://schemas.microsoft.com/sharepoint/v3/contenttype/forms">
-  <Display>DocumentLibraryForm</Display>
-  <Edit>DocumentLibraryForm</Edit>
-  <New>DocumentLibraryForm</New>
-</FormTemplates>
+<file path=ppt/theme/theme2.xml><?xml version="1.0" encoding="utf-8"?>
+<a:theme xmlns:a="http://schemas.openxmlformats.org/drawingml/2006/main" name="Office Theme">
+  <a:themeElements>
+    <a:clrScheme name="Office">
+      <a:dk1>
+        <a:sysClr val="windowText" lastClr="000000"/>
+      </a:dk1>
+      <a:lt1>
+        <a:sysClr val="window" lastClr="FFFFFF"/>
+      </a:lt1>
+      <a:dk2>
+        <a:srgbClr val="0E2841"/>
+      </a:dk2>
+      <a:lt2>
+        <a:srgbClr val="E8E8E8"/>
+      </a:lt2>
+      <a:accent1>
+        <a:srgbClr val="156082"/>
+      </a:accent1>
+      <a:accent2>
+        <a:srgbClr val="E97132"/>
+      </a:accent2>
+      <a:accent3>
+        <a:srgbClr val="196B24"/>
+      </a:accent3>
+      <a:accent4>
+        <a:srgbClr val="0F9ED5"/>
+      </a:accent4>
+      <a:accent5>
+        <a:srgbClr val="A02B93"/>
+      </a:accent5>
+      <a:accent6>
+        <a:srgbClr val="4EA72E"/>
+      </a:accent6>
+      <a:hlink>
+        <a:srgbClr val="467886"/>
+      </a:hlink>
+      <a:folHlink>
+        <a:srgbClr val="96607D"/>
+      </a:folHlink>
+    </a:clrScheme>
+    <a:fontScheme name="Office">
+      <a:majorFont>
+        <a:latin typeface="Aptos Display" panose="02110004020202020204"/>
+        <a:ea typeface=""/>
+        <a:cs typeface=""/>
+        <a:font script="Jpan" typeface="游ゴシック Light"/>
+        <a:font script="Hang" typeface="맑은 고딕"/>
+        <a:font script="Hans" typeface="等线 Light"/>
+        <a:font script="Hant" typeface="新細明體"/>
+        <a:font script="Arab" typeface="Times New Roman"/>
+        <a:font script="Hebr" typeface="Times New Roman"/>
+        <a:font script="Thai" typeface="Angsana New"/>
+        <a:font script="Ethi" typeface="Nyala"/>
+        <a:font script="Beng" typeface="Vrinda"/>
+        <a:font script="Gujr" typeface="Shruti"/>
+        <a:font script="Khmr" typeface="MoolBoran"/>
+        <a:font script="Knda" typeface="Tunga"/>
+        <a:font script="Guru" typeface="Raavi"/>
+        <a:font script="Cans" typeface="Euphemia"/>
+        <a:font script="Cher" typeface="Plantagenet Cherokee"/>
+        <a:font script="Yiii" typeface="Microsoft Yi Baiti"/>
+        <a:font script="Tibt" typeface="Microsoft Himalaya"/>
+        <a:font script="Thaa" typeface="MV Boli"/>
+        <a:font script="Deva" typeface="Mangal"/>
+        <a:font script="Telu" typeface="Gautami"/>
+        <a:font script="Taml" typeface="Latha"/>
+        <a:font script="Syrc" typeface="Estrangelo Edessa"/>
+        <a:font script="Orya" typeface="Kalinga"/>
+        <a:font script="Mlym" typeface="Kartika"/>
+        <a:font script="Laoo" typeface="DokChampa"/>
+        <a:font script="Sinh" typeface="Iskoola Pota"/>
+        <a:font script="Mong" typeface="Mongolian Baiti"/>
+        <a:font script="Viet" typeface="Times New Roman"/>
+        <a:font script="Uigh" typeface="Microsoft Uighur"/>
+        <a:font script="Geor" typeface="Sylfaen"/>
+        <a:font script="Armn" typeface="Arial"/>
+        <a:font script="Bugi" typeface="Leelawadee UI"/>
+        <a:font script="Bopo" typeface="Microsoft JhengHei"/>
+        <a:font script="Java" typeface="Javanese Text"/>
+        <a:font script="Lisu" typeface="Segoe UI"/>
+        <a:font script="Mymr" typeface="Myanmar Text"/>
+        <a:font script="Nkoo" typeface="Ebrima"/>
+        <a:font script="Olck" typeface="Nirmala UI"/>
+        <a:font script="Osma" typeface="Ebrima"/>
+        <a:font script="Phag" typeface="Phagspa"/>
+        <a:font script="Syrn" typeface="Estrangelo Edessa"/>
+        <a:font script="Syrj" typeface="Estrangelo Edessa"/>
+        <a:font script="Syre" typeface="Estrangelo Edessa"/>
+        <a:font script="Sora" typeface="Nirmala UI"/>
+        <a:font script="Tale" typeface="Microsoft Tai Le"/>
+        <a:font script="Talu" typeface="Microsoft New Tai Lue"/>
+        <a:font script="Tfng" typeface="Ebrima"/>
+      </a:majorFont>
+      <a:minorFont>
+        <a:latin typeface="Aptos" panose="02110004020202020204"/>
+        <a:ea typeface=""/>
+        <a:cs typeface=""/>
+        <a:font script="Jpan" typeface="游ゴシック"/>
+        <a:font script="Hang" typeface="맑은 고딕"/>
+        <a:font script="Hans" typeface="等线"/>
+        <a:font script="Hant" typeface="新細明體"/>
+        <a:font script="Arab" typeface="Arial"/>
+        <a:font script="Hebr" typeface="Arial"/>
+        <a:font script="Thai" typeface="Cordia New"/>
+        <a:font script="Ethi" typeface="Nyala"/>
+        <a:font script="Beng" typeface="Vrinda"/>
+        <a:font script="Gujr" typeface="Shruti"/>
+        <a:font script="Khmr" typeface="DaunPenh"/>
+        <a:font script="Knda" typeface="Tunga"/>
+        <a:font script="Guru" typeface="Raavi"/>
+        <a:font script="Cans" typeface="Euphemia"/>
+        <a:font script="Cher" typeface="Plantagenet Cherokee"/>
+        <a:font script="Yiii" typeface="Microsoft Yi Baiti"/>
+        <a:font script="Tibt" typeface="Microsoft Himalaya"/>
+        <a:font script="Thaa" typeface="MV Boli"/>
+        <a:font script="Deva" typeface="Mangal"/>
+        <a:font script="Telu" typeface="Gautami"/>
+        <a:font script="Taml" typeface="Latha"/>
+        <a:font script="Syrc" typeface="Estrangelo Edessa"/>
+        <a:font script="Orya" typeface="Kalinga"/>
+        <a:font script="Mlym" typeface="Kartika"/>
+        <a:font script="Laoo" typeface="DokChampa"/>
+        <a:font script="Sinh" typeface="Iskoola Pota"/>
+        <a:font script="Mong" typeface="Mongolian Baiti"/>
+        <a:font script="Viet" typeface="Arial"/>
+        <a:font script="Uigh" typeface="Microsoft Uighur"/>
+        <a:font script="Geor" typeface="Sylfaen"/>
+        <a:font script="Armn" typeface="Arial"/>
+        <a:font script="Bugi" typeface="Leelawadee UI"/>
+        <a:font script="Bopo" typeface="Microsoft JhengHei"/>
+        <a:font script="Java" typeface="Javanese Text"/>
+        <a:font script="Lisu" typeface="Segoe UI"/>
+        <a:font script="Mymr" typeface="Myanmar Text"/>
+        <a:font script="Nkoo" typeface="Ebrima"/>
+        <a:font script="Olck" typeface="Nirmala UI"/>
+        <a:font script="Osma" typeface="Ebrima"/>
+        <a:font script="Phag" typeface="Phagspa"/>
+        <a:font script="Syrn" typeface="Estrangelo Edessa"/>
+        <a:font script="Syrj" typeface="Estrangelo Edessa"/>
+        <a:font script="Syre" typeface="Estrangelo Edessa"/>
+        <a:font script="Sora" typeface="Nirmala UI"/>
+        <a:font script="Tale" typeface="Microsoft Tai Le"/>
+        <a:font script="Talu" typeface="Microsoft New Tai Lue"/>
+        <a:font script="Tfng" typeface="Ebrima"/>
+      </a:minorFont>
+    </a:fontScheme>
+    <a:fmtScheme name="Office">
+      <a:fillStyleLst>
+        <a:solidFill>
+          <a:schemeClr val="phClr"/>
+        </a:solidFill>
+        <a:gradFill rotWithShape="1">
+          <a:gsLst>
+            <a:gs pos="0">
+              <a:schemeClr val="phClr">
+                <a:lumMod val="110000"/>
+                <a:satMod val="105000"/>
+                <a:tint val="67000"/>
+              </a:schemeClr>
+            </a:gs>
+            <a:gs pos="50000">
+              <a:schemeClr val="phClr">
+                <a:lumMod val="105000"/>
+                <a:satMod val="103000"/>
+                <a:tint val="73000"/>
+              </a:schemeClr>
+            </a:gs>
+            <a:gs pos="100000">
+              <a:schemeClr val="phClr">
+                <a:lumMod val="105000"/>
+                <a:satMod val="109000"/>
+                <a:tint val="81000"/>
+              </a:schemeClr>
+            </a:gs>
+          </a:gsLst>
+          <a:lin ang="5400000" scaled="0"/>
+        </a:gradFill>
+        <a:gradFill rotWithShape="1">
+          <a:gsLst>
+            <a:gs pos="0">
+              <a:schemeClr val="phClr">
+                <a:satMod val="103000"/>
+                <a:lumMod val="102000"/>
+                <a:tint val="94000"/>
+              </a:schemeClr>
+            </a:gs>
+            <a:gs pos="50000">
+              <a:schemeClr val="phClr">
+                <a:satMod val="110000"/>
+                <a:lumMod val="100000"/>
+                <a:shade val="100000"/>
+              </a:schemeClr>
+            </a:gs>
+            <a:gs pos="100000">
+              <a:schemeClr val="phClr">
+                <a:lumMod val="99000"/>
+                <a:satMod val="120000"/>
+                <a:shade val="78000"/>
+              </a:schemeClr>
+            </a:gs>
+          </a:gsLst>
+          <a:lin ang="5400000" scaled="0"/>
+        </a:gradFill>
+      </a:fillStyleLst>
+      <a:lnStyleLst>
+        <a:ln w="12700" cap="flat" cmpd="sng" algn="ctr">
+          <a:solidFill>
+            <a:schemeClr val="phClr"/>
+          </a:solidFill>
+          <a:prstDash val="solid"/>
+          <a:miter lim="800000"/>
+        </a:ln>
+        <a:ln w="19050" cap="flat" cmpd="sng" algn="ctr">
+          <a:solidFill>
+            <a:schemeClr val="phClr"/>
+          </a:solidFill>
+          <a:prstDash val="solid"/>
+          <a:miter lim="800000"/>
+        </a:ln>
+        <a:ln w="25400" cap="flat" cmpd="sng" algn="ctr">
+          <a:solidFill>
+            <a:schemeClr val="phClr"/>
+          </a:solidFill>
+          <a:prstDash val="solid"/>
+          <a:miter lim="800000"/>
+        </a:ln>
+      </a:lnStyleLst>
+      <a:effectStyleLst>
+        <a:effectStyle>
+          <a:effectLst/>
+        </a:effectStyle>
+        <a:effectStyle>
+          <a:effectLst/>
+        </a:effectStyle>
+        <a:effectStyle>
+          <a:effectLst>
+            <a:outerShdw blurRad="57150" dist="19050" dir="5400000" algn="ctr" rotWithShape="0">
+              <a:srgbClr val="000000">
+                <a:alpha val="63000"/>
+              </a:srgbClr>
+            </a:outerShdw>
+          </a:effectLst>
+        </a:effectStyle>
+      </a:effectStyleLst>
+      <a:bgFillStyleLst>
+        <a:solidFill>
+          <a:schemeClr val="phClr"/>
+        </a:solidFill>
+        <a:solidFill>
+          <a:schemeClr val="phClr">
+            <a:tint val="95000"/>
+            <a:satMod val="170000"/>
+          </a:schemeClr>
+        </a:solidFill>
+        <a:gradFill rotWithShape="1">
+          <a:gsLst>
+            <a:gs pos="0">
+              <a:schemeClr val="phClr">
+                <a:tint val="93000"/>
+                <a:satMod val="150000"/>
+                <a:shade val="98000"/>
+                <a:lumMod val="102000"/>
+              </a:schemeClr>
+            </a:gs>
+            <a:gs pos="50000">
+              <a:schemeClr val="phClr">
+                <a:tint val="98000"/>
+                <a:satMod val="130000"/>
+                <a:shade val="90000"/>
+                <a:lumMod val="103000"/>
+              </a:schemeClr>
+            </a:gs>
+            <a:gs pos="100000">
+              <a:schemeClr val="phClr">
+                <a:shade val="63000"/>
+                <a:satMod val="120000"/>
+              </a:schemeClr>
+            </a:gs>
+          </a:gsLst>
+          <a:lin ang="5400000" scaled="0"/>
+        </a:gradFill>
+      </a:bgFillStyleLst>
+    </a:fmtScheme>
+  </a:themeElements>
+  <a:objectDefaults>
+    <a:lnDef>
+      <a:spPr/>
+      <a:bodyPr/>
+      <a:lstStyle/>
+      <a:style>
+        <a:lnRef idx="2">
+          <a:schemeClr val="accent1"/>
+        </a:lnRef>
+        <a:fillRef idx="0">
+          <a:schemeClr val="accent1"/>
+        </a:fillRef>
+        <a:effectRef idx="1">
+          <a:schemeClr val="accent1"/>
+        </a:effectRef>
+        <a:fontRef idx="minor">
+          <a:schemeClr val="tx1"/>
+        </a:fontRef>
+      </a:style>
+    </a:lnDef>
+  </a:objectDefaults>
+  <a:extraClrSchemeLst/>
+  <a:extLst>
+    <a:ext uri="{05A4C25C-085E-4340-85A3-A5531E510DB2}">
+      <thm15:themeFamily xmlns:thm15="http://schemas.microsoft.com/office/thememl/2012/main" name="Office Theme" id="{2E142A2C-CD16-42D6-873A-C26D2A0506FA}" vid="{1BDDFF52-6CD6-40A5-AB3C-68EB2F1E4D0A}"/>
+    </a:ext>
+  </a:extLst>
+</a:theme>
 </file>
 
-<file path=customXml/item2.xml><?xml version="1.0" encoding="utf-8"?>
-<p:properties xmlns:p="http://schemas.microsoft.com/office/2006/metadata/properties" xmlns:xsi="http://www.w3.org/2001/XMLSchema-instance" xmlns:pc="http://schemas.microsoft.com/office/infopath/2007/PartnerControls">
-  <documentManagement>
-    <lcf76f155ced4ddcb4097134ff3c332f xmlns="d0d0097c-64f4-4e3b-99a3-bc1c796771ba">
-      <Terms xmlns="http://schemas.microsoft.com/office/infopath/2007/PartnerControls"/>
-    </lcf76f155ced4ddcb4097134ff3c332f>
-    <TaxCatchAll xmlns="a7e95da2-8946-49ae-a42c-eac0e2e49090" xsi:nil="true"/>
-  </documentManagement>
-</p:properties>
-</file>
-
-<file path=customXml/item3.xml><?xml version="1.0" encoding="utf-8"?>
+<file path=customXml/item1.xml><?xml version="1.0" encoding="utf-8"?>
 <ct:contentTypeSchema xmlns:ct="http://schemas.microsoft.com/office/2006/metadata/contentType" xmlns:ma="http://schemas.microsoft.com/office/2006/metadata/properties/metaAttributes" ct:_="" ma:_="" ma:contentTypeName="Document" ma:contentTypeID="0x010100DC58E895C404BE40B8E18D2FE0DE171E" ma:contentTypeVersion="15" ma:contentTypeDescription="Create a new document." ma:contentTypeScope="" ma:versionID="e3b50e3d3966c5dce05a9c59b7961e98">
   <xsd:schema xmlns:xsd="http://www.w3.org/2001/XMLSchema" xmlns:xs="http://www.w3.org/2001/XMLSchema" xmlns:p="http://schemas.microsoft.com/office/2006/metadata/properties" xmlns:ns2="d0d0097c-64f4-4e3b-99a3-bc1c796771ba" xmlns:ns3="a7e95da2-8946-49ae-a42c-eac0e2e49090" targetNamespace="http://schemas.microsoft.com/office/2006/metadata/properties" ma:root="true" ma:fieldsID="846743cf0710f7e7c5b0659fc053b820" ns2:_="" ns3:_="">
     <xsd:import namespace="d0d0097c-64f4-4e3b-99a3-bc1c796771ba"/>
@@ -5100,10 +6555,41 @@
 </ct:contentTypeSchema>
 </file>
 
+<file path=customXml/item2.xml><?xml version="1.0" encoding="utf-8"?>
+<p:properties xmlns:p="http://schemas.microsoft.com/office/2006/metadata/properties" xmlns:xsi="http://www.w3.org/2001/XMLSchema-instance" xmlns:pc="http://schemas.microsoft.com/office/infopath/2007/PartnerControls">
+  <documentManagement>
+    <lcf76f155ced4ddcb4097134ff3c332f xmlns="d0d0097c-64f4-4e3b-99a3-bc1c796771ba">
+      <Terms xmlns="http://schemas.microsoft.com/office/infopath/2007/PartnerControls"/>
+    </lcf76f155ced4ddcb4097134ff3c332f>
+    <TaxCatchAll xmlns="a7e95da2-8946-49ae-a42c-eac0e2e49090" xsi:nil="true"/>
+  </documentManagement>
+</p:properties>
+</file>
+
+<file path=customXml/item3.xml><?xml version="1.0" encoding="utf-8"?>
+<?mso-contentType ?>
+<FormTemplates xmlns="http://schemas.microsoft.com/sharepoint/v3/contenttype/forms">
+  <Display>DocumentLibraryForm</Display>
+  <Edit>DocumentLibraryForm</Edit>
+  <New>DocumentLibraryForm</New>
+</FormTemplates>
+</file>
+
 <file path=customXml/itemProps1.xml><?xml version="1.0" encoding="utf-8"?>
-<ds:datastoreItem xmlns:ds="http://schemas.openxmlformats.org/officeDocument/2006/customXml" ds:itemID="{3D5FAE3B-CFC5-4FC7-9790-E3F2C457D1FA}">
+<ds:datastoreItem xmlns:ds="http://schemas.openxmlformats.org/officeDocument/2006/customXml" ds:itemID="{30F31322-97E6-44DA-A806-71B0717683FF}">
   <ds:schemaRefs>
-    <ds:schemaRef ds:uri="http://schemas.microsoft.com/sharepoint/v3/contenttype/forms"/>
+    <ds:schemaRef ds:uri="http://schemas.microsoft.com/office/2006/metadata/contentType"/>
+    <ds:schemaRef ds:uri="http://schemas.microsoft.com/office/2006/metadata/properties/metaAttributes"/>
+    <ds:schemaRef ds:uri="http://www.w3.org/2001/XMLSchema"/>
+    <ds:schemaRef ds:uri="http://schemas.microsoft.com/office/2006/metadata/properties"/>
+    <ds:schemaRef ds:uri="d0d0097c-64f4-4e3b-99a3-bc1c796771ba"/>
+    <ds:schemaRef ds:uri="a7e95da2-8946-49ae-a42c-eac0e2e49090"/>
+    <ds:schemaRef ds:uri="http://schemas.microsoft.com/office/2006/documentManagement/types"/>
+    <ds:schemaRef ds:uri="http://schemas.microsoft.com/office/infopath/2007/PartnerControls"/>
+    <ds:schemaRef ds:uri="http://schemas.openxmlformats.org/package/2006/metadata/core-properties"/>
+    <ds:schemaRef ds:uri="http://purl.org/dc/elements/1.1/"/>
+    <ds:schemaRef ds:uri="http://purl.org/dc/terms/"/>
+    <ds:schemaRef ds:uri="http://schemas.microsoft.com/internal/obd"/>
   </ds:schemaRefs>
 </ds:datastoreItem>
 </file>
@@ -5120,20 +6606,9 @@
 </file>
 
 <file path=customXml/itemProps3.xml><?xml version="1.0" encoding="utf-8"?>
-<ds:datastoreItem xmlns:ds="http://schemas.openxmlformats.org/officeDocument/2006/customXml" ds:itemID="{30F31322-97E6-44DA-A806-71B0717683FF}">
+<ds:datastoreItem xmlns:ds="http://schemas.openxmlformats.org/officeDocument/2006/customXml" ds:itemID="{3D5FAE3B-CFC5-4FC7-9790-E3F2C457D1FA}">
   <ds:schemaRefs>
-    <ds:schemaRef ds:uri="http://schemas.microsoft.com/office/2006/metadata/contentType"/>
-    <ds:schemaRef ds:uri="http://schemas.microsoft.com/office/2006/metadata/properties/metaAttributes"/>
-    <ds:schemaRef ds:uri="http://www.w3.org/2001/XMLSchema"/>
-    <ds:schemaRef ds:uri="http://schemas.microsoft.com/office/2006/metadata/properties"/>
-    <ds:schemaRef ds:uri="d0d0097c-64f4-4e3b-99a3-bc1c796771ba"/>
-    <ds:schemaRef ds:uri="a7e95da2-8946-49ae-a42c-eac0e2e49090"/>
-    <ds:schemaRef ds:uri="http://schemas.microsoft.com/office/2006/documentManagement/types"/>
-    <ds:schemaRef ds:uri="http://schemas.microsoft.com/office/infopath/2007/PartnerControls"/>
-    <ds:schemaRef ds:uri="http://schemas.openxmlformats.org/package/2006/metadata/core-properties"/>
-    <ds:schemaRef ds:uri="http://purl.org/dc/elements/1.1/"/>
-    <ds:schemaRef ds:uri="http://purl.org/dc/terms/"/>
-    <ds:schemaRef ds:uri="http://schemas.microsoft.com/internal/obd"/>
+    <ds:schemaRef ds:uri="http://schemas.microsoft.com/sharepoint/v3/contenttype/forms"/>
   </ds:schemaRefs>
 </ds:datastoreItem>
 </file>
</xml_diff>

<commit_message>
Meeting with John 3/19
</commit_message>
<xml_diff>
--- a/Deliverables/Presentation/Writing_Project_Presentation.pptx
+++ b/Deliverables/Presentation/Writing_Project_Presentation.pptx
@@ -219,7 +219,7 @@
           <a:p>
             <a:fld id="{7BCE2282-E3BC-46FF-84F2-CE6FEE4549E5}" type="datetimeFigureOut">
               <a:rPr lang="en-US" smtClean="0"/>
-              <a:t>3/11/2024</a:t>
+              <a:t>3/19/2024</a:t>
             </a:fld>
             <a:endParaRPr lang="en-US"/>
           </a:p>
@@ -851,7 +851,7 @@
           <a:p>
             <a:fld id="{07A9634C-365A-9845-9775-8941B6FBB9ED}" type="datetimeFigureOut">
               <a:rPr lang="en-US" smtClean="0"/>
-              <a:t>3/11/2024</a:t>
+              <a:t>3/19/2024</a:t>
             </a:fld>
             <a:endParaRPr lang="en-US"/>
           </a:p>
@@ -1019,7 +1019,7 @@
           <a:p>
             <a:fld id="{07A9634C-365A-9845-9775-8941B6FBB9ED}" type="datetimeFigureOut">
               <a:rPr lang="en-US" smtClean="0"/>
-              <a:t>3/11/2024</a:t>
+              <a:t>3/19/2024</a:t>
             </a:fld>
             <a:endParaRPr lang="en-US"/>
           </a:p>
@@ -1197,7 +1197,7 @@
           <a:p>
             <a:fld id="{07A9634C-365A-9845-9775-8941B6FBB9ED}" type="datetimeFigureOut">
               <a:rPr lang="en-US" smtClean="0"/>
-              <a:t>3/11/2024</a:t>
+              <a:t>3/19/2024</a:t>
             </a:fld>
             <a:endParaRPr lang="en-US"/>
           </a:p>
@@ -1373,7 +1373,7 @@
           <a:p>
             <a:fld id="{07A9634C-365A-9845-9775-8941B6FBB9ED}" type="datetimeFigureOut">
               <a:rPr lang="en-US" smtClean="0"/>
-              <a:t>3/11/2024</a:t>
+              <a:t>3/19/2024</a:t>
             </a:fld>
             <a:endParaRPr lang="en-US"/>
           </a:p>
@@ -1618,7 +1618,7 @@
           <a:p>
             <a:fld id="{07A9634C-365A-9845-9775-8941B6FBB9ED}" type="datetimeFigureOut">
               <a:rPr lang="en-US" smtClean="0"/>
-              <a:t>3/11/2024</a:t>
+              <a:t>3/19/2024</a:t>
             </a:fld>
             <a:endParaRPr lang="en-US"/>
           </a:p>
@@ -1903,7 +1903,7 @@
           <a:p>
             <a:fld id="{07A9634C-365A-9845-9775-8941B6FBB9ED}" type="datetimeFigureOut">
               <a:rPr lang="en-US" smtClean="0"/>
-              <a:t>3/11/2024</a:t>
+              <a:t>3/19/2024</a:t>
             </a:fld>
             <a:endParaRPr lang="en-US"/>
           </a:p>
@@ -2322,7 +2322,7 @@
           <a:p>
             <a:fld id="{07A9634C-365A-9845-9775-8941B6FBB9ED}" type="datetimeFigureOut">
               <a:rPr lang="en-US" smtClean="0"/>
-              <a:t>3/11/2024</a:t>
+              <a:t>3/19/2024</a:t>
             </a:fld>
             <a:endParaRPr lang="en-US"/>
           </a:p>
@@ -2439,7 +2439,7 @@
           <a:p>
             <a:fld id="{07A9634C-365A-9845-9775-8941B6FBB9ED}" type="datetimeFigureOut">
               <a:rPr lang="en-US" smtClean="0"/>
-              <a:t>3/11/2024</a:t>
+              <a:t>3/19/2024</a:t>
             </a:fld>
             <a:endParaRPr lang="en-US"/>
           </a:p>
@@ -2534,7 +2534,7 @@
           <a:p>
             <a:fld id="{07A9634C-365A-9845-9775-8941B6FBB9ED}" type="datetimeFigureOut">
               <a:rPr lang="en-US" smtClean="0"/>
-              <a:t>3/11/2024</a:t>
+              <a:t>3/19/2024</a:t>
             </a:fld>
             <a:endParaRPr lang="en-US"/>
           </a:p>
@@ -2809,7 +2809,7 @@
           <a:p>
             <a:fld id="{07A9634C-365A-9845-9775-8941B6FBB9ED}" type="datetimeFigureOut">
               <a:rPr lang="en-US" smtClean="0"/>
-              <a:t>3/11/2024</a:t>
+              <a:t>3/19/2024</a:t>
             </a:fld>
             <a:endParaRPr lang="en-US"/>
           </a:p>
@@ -3061,7 +3061,7 @@
           <a:p>
             <a:fld id="{07A9634C-365A-9845-9775-8941B6FBB9ED}" type="datetimeFigureOut">
               <a:rPr lang="en-US" smtClean="0"/>
-              <a:t>3/11/2024</a:t>
+              <a:t>3/19/2024</a:t>
             </a:fld>
             <a:endParaRPr lang="en-US"/>
           </a:p>
@@ -3302,7 +3302,7 @@
           <a:p>
             <a:fld id="{07A9634C-365A-9845-9775-8941B6FBB9ED}" type="datetimeFigureOut">
               <a:rPr lang="en-US" smtClean="0"/>
-              <a:t>3/11/2024</a:t>
+              <a:t>3/19/2024</a:t>
             </a:fld>
             <a:endParaRPr lang="en-US"/>
           </a:p>
@@ -3721,6 +3721,12 @@
               <a:t>Eliot Liucci</a:t>
             </a:r>
           </a:p>
+          <a:p>
+            <a:r>
+              <a:rPr lang="en-US" dirty="0"/>
+              <a:t>Dr. John Smith</a:t>
+            </a:r>
+          </a:p>
         </p:txBody>
       </p:sp>
     </p:spTree>
@@ -3824,7 +3830,15 @@
             </a:r>
             <a:r>
               <a:rPr lang="en-US" dirty="0"/>
-              <a:t> order AR, 4</a:t>
+              <a:t> order AR, 1</a:t>
+            </a:r>
+            <a:r>
+              <a:rPr lang="en-US" baseline="30000" dirty="0"/>
+              <a:t>st</a:t>
+            </a:r>
+            <a:r>
+              <a:rPr lang="en-US" dirty="0"/>
+              <a:t> order I, 4</a:t>
             </a:r>
             <a:r>
               <a:rPr lang="en-US" baseline="30000" dirty="0"/>
@@ -6325,6 +6339,26 @@
 </file>
 
 <file path=customXml/item1.xml><?xml version="1.0" encoding="utf-8"?>
+<?mso-contentType ?>
+<FormTemplates xmlns="http://schemas.microsoft.com/sharepoint/v3/contenttype/forms">
+  <Display>DocumentLibraryForm</Display>
+  <Edit>DocumentLibraryForm</Edit>
+  <New>DocumentLibraryForm</New>
+</FormTemplates>
+</file>
+
+<file path=customXml/item2.xml><?xml version="1.0" encoding="utf-8"?>
+<p:properties xmlns:p="http://schemas.microsoft.com/office/2006/metadata/properties" xmlns:xsi="http://www.w3.org/2001/XMLSchema-instance" xmlns:pc="http://schemas.microsoft.com/office/infopath/2007/PartnerControls">
+  <documentManagement>
+    <lcf76f155ced4ddcb4097134ff3c332f xmlns="d0d0097c-64f4-4e3b-99a3-bc1c796771ba">
+      <Terms xmlns="http://schemas.microsoft.com/office/infopath/2007/PartnerControls"/>
+    </lcf76f155ced4ddcb4097134ff3c332f>
+    <TaxCatchAll xmlns="a7e95da2-8946-49ae-a42c-eac0e2e49090" xsi:nil="true"/>
+  </documentManagement>
+</p:properties>
+</file>
+
+<file path=customXml/item3.xml><?xml version="1.0" encoding="utf-8"?>
 <ct:contentTypeSchema xmlns:ct="http://schemas.microsoft.com/office/2006/metadata/contentType" xmlns:ma="http://schemas.microsoft.com/office/2006/metadata/properties/metaAttributes" ct:_="" ma:_="" ma:contentTypeName="Document" ma:contentTypeID="0x010100DC58E895C404BE40B8E18D2FE0DE171E" ma:contentTypeVersion="15" ma:contentTypeDescription="Create a new document." ma:contentTypeScope="" ma:versionID="e3b50e3d3966c5dce05a9c59b7961e98">
   <xsd:schema xmlns:xsd="http://www.w3.org/2001/XMLSchema" xmlns:xs="http://www.w3.org/2001/XMLSchema" xmlns:p="http://schemas.microsoft.com/office/2006/metadata/properties" xmlns:ns2="d0d0097c-64f4-4e3b-99a3-bc1c796771ba" xmlns:ns3="a7e95da2-8946-49ae-a42c-eac0e2e49090" targetNamespace="http://schemas.microsoft.com/office/2006/metadata/properties" ma:root="true" ma:fieldsID="846743cf0710f7e7c5b0659fc053b820" ns2:_="" ns3:_="">
     <xsd:import namespace="d0d0097c-64f4-4e3b-99a3-bc1c796771ba"/>
@@ -6555,27 +6589,26 @@
 </ct:contentTypeSchema>
 </file>
 
-<file path=customXml/item2.xml><?xml version="1.0" encoding="utf-8"?>
-<p:properties xmlns:p="http://schemas.microsoft.com/office/2006/metadata/properties" xmlns:xsi="http://www.w3.org/2001/XMLSchema-instance" xmlns:pc="http://schemas.microsoft.com/office/infopath/2007/PartnerControls">
-  <documentManagement>
-    <lcf76f155ced4ddcb4097134ff3c332f xmlns="d0d0097c-64f4-4e3b-99a3-bc1c796771ba">
-      <Terms xmlns="http://schemas.microsoft.com/office/infopath/2007/PartnerControls"/>
-    </lcf76f155ced4ddcb4097134ff3c332f>
-    <TaxCatchAll xmlns="a7e95da2-8946-49ae-a42c-eac0e2e49090" xsi:nil="true"/>
-  </documentManagement>
-</p:properties>
+<file path=customXml/itemProps1.xml><?xml version="1.0" encoding="utf-8"?>
+<ds:datastoreItem xmlns:ds="http://schemas.openxmlformats.org/officeDocument/2006/customXml" ds:itemID="{3D5FAE3B-CFC5-4FC7-9790-E3F2C457D1FA}">
+  <ds:schemaRefs>
+    <ds:schemaRef ds:uri="http://schemas.microsoft.com/sharepoint/v3/contenttype/forms"/>
+  </ds:schemaRefs>
+</ds:datastoreItem>
 </file>
 
-<file path=customXml/item3.xml><?xml version="1.0" encoding="utf-8"?>
-<?mso-contentType ?>
-<FormTemplates xmlns="http://schemas.microsoft.com/sharepoint/v3/contenttype/forms">
-  <Display>DocumentLibraryForm</Display>
-  <Edit>DocumentLibraryForm</Edit>
-  <New>DocumentLibraryForm</New>
-</FormTemplates>
+<file path=customXml/itemProps2.xml><?xml version="1.0" encoding="utf-8"?>
+<ds:datastoreItem xmlns:ds="http://schemas.openxmlformats.org/officeDocument/2006/customXml" ds:itemID="{0A361201-2870-471D-85D3-8260AD892915}">
+  <ds:schemaRefs>
+    <ds:schemaRef ds:uri="http://schemas.microsoft.com/office/2006/metadata/properties"/>
+    <ds:schemaRef ds:uri="http://schemas.microsoft.com/office/infopath/2007/PartnerControls"/>
+    <ds:schemaRef ds:uri="d0d0097c-64f4-4e3b-99a3-bc1c796771ba"/>
+    <ds:schemaRef ds:uri="a7e95da2-8946-49ae-a42c-eac0e2e49090"/>
+  </ds:schemaRefs>
+</ds:datastoreItem>
 </file>
 
-<file path=customXml/itemProps1.xml><?xml version="1.0" encoding="utf-8"?>
+<file path=customXml/itemProps3.xml><?xml version="1.0" encoding="utf-8"?>
 <ds:datastoreItem xmlns:ds="http://schemas.openxmlformats.org/officeDocument/2006/customXml" ds:itemID="{30F31322-97E6-44DA-A806-71B0717683FF}">
   <ds:schemaRefs>
     <ds:schemaRef ds:uri="http://schemas.microsoft.com/office/2006/metadata/contentType"/>
@@ -6592,23 +6625,4 @@
     <ds:schemaRef ds:uri="http://schemas.microsoft.com/internal/obd"/>
   </ds:schemaRefs>
 </ds:datastoreItem>
-</file>
-
-<file path=customXml/itemProps2.xml><?xml version="1.0" encoding="utf-8"?>
-<ds:datastoreItem xmlns:ds="http://schemas.openxmlformats.org/officeDocument/2006/customXml" ds:itemID="{0A361201-2870-471D-85D3-8260AD892915}">
-  <ds:schemaRefs>
-    <ds:schemaRef ds:uri="http://schemas.microsoft.com/office/2006/metadata/properties"/>
-    <ds:schemaRef ds:uri="http://schemas.microsoft.com/office/infopath/2007/PartnerControls"/>
-    <ds:schemaRef ds:uri="d0d0097c-64f4-4e3b-99a3-bc1c796771ba"/>
-    <ds:schemaRef ds:uri="a7e95da2-8946-49ae-a42c-eac0e2e49090"/>
-  </ds:schemaRefs>
-</ds:datastoreItem>
-</file>
-
-<file path=customXml/itemProps3.xml><?xml version="1.0" encoding="utf-8"?>
-<ds:datastoreItem xmlns:ds="http://schemas.openxmlformats.org/officeDocument/2006/customXml" ds:itemID="{3D5FAE3B-CFC5-4FC7-9790-E3F2C457D1FA}">
-  <ds:schemaRefs>
-    <ds:schemaRef ds:uri="http://schemas.microsoft.com/sharepoint/v3/contenttype/forms"/>
-  </ds:schemaRefs>
-</ds:datastoreItem>
 </file>
</xml_diff>

<commit_message>
Fixing LSTM vs ARIMA plot axes labels
</commit_message>
<xml_diff>
--- a/Deliverables/Presentation/Writing_Project_Presentation.pptx
+++ b/Deliverables/Presentation/Writing_Project_Presentation.pptx
@@ -3810,7 +3810,9 @@
           </a:xfrm>
         </p:spPr>
         <p:txBody>
-          <a:bodyPr/>
+          <a:bodyPr>
+            <a:normAutofit fontScale="92500"/>
+          </a:bodyPr>
           <a:lstStyle/>
           <a:p>
             <a:r>
@@ -3821,31 +3823,31 @@
           <a:p>
             <a:pPr lvl="1"/>
             <a:r>
-              <a:rPr lang="en-US" dirty="0"/>
+              <a:rPr lang="en-US" sz="2600" dirty="0"/>
               <a:t>ARIMA: 1</a:t>
             </a:r>
             <a:r>
-              <a:rPr lang="en-US" baseline="30000" dirty="0"/>
+              <a:rPr lang="en-US" sz="2600" baseline="30000" dirty="0"/>
               <a:t>st</a:t>
             </a:r>
             <a:r>
-              <a:rPr lang="en-US" dirty="0"/>
+              <a:rPr lang="en-US" sz="2600" dirty="0"/>
               <a:t> order AR, 1</a:t>
             </a:r>
             <a:r>
-              <a:rPr lang="en-US" baseline="30000" dirty="0"/>
+              <a:rPr lang="en-US" sz="2600" baseline="30000" dirty="0"/>
               <a:t>st</a:t>
             </a:r>
             <a:r>
-              <a:rPr lang="en-US" dirty="0"/>
-              <a:t> order I, 4</a:t>
-            </a:r>
-            <a:r>
-              <a:rPr lang="en-US" baseline="30000" dirty="0"/>
+              <a:rPr lang="en-US" sz="2600" dirty="0"/>
+              <a:t> order Differencing, 4</a:t>
+            </a:r>
+            <a:r>
+              <a:rPr lang="en-US" sz="2600" baseline="30000" dirty="0"/>
               <a:t>th</a:t>
             </a:r>
             <a:r>
-              <a:rPr lang="en-US" dirty="0"/>
+              <a:rPr lang="en-US" sz="2600" dirty="0"/>
               <a:t> order MA</a:t>
             </a:r>
           </a:p>
@@ -3873,7 +3875,7 @@
         <p:spPr>
           <a:xfrm>
             <a:off x="1317809" y="2679700"/>
-            <a:ext cx="6508381" cy="3254190"/>
+            <a:ext cx="6508380" cy="3254190"/>
           </a:xfrm>
           <a:prstGeom prst="rect">
             <a:avLst/>
@@ -6339,26 +6341,6 @@
 </file>
 
 <file path=customXml/item1.xml><?xml version="1.0" encoding="utf-8"?>
-<?mso-contentType ?>
-<FormTemplates xmlns="http://schemas.microsoft.com/sharepoint/v3/contenttype/forms">
-  <Display>DocumentLibraryForm</Display>
-  <Edit>DocumentLibraryForm</Edit>
-  <New>DocumentLibraryForm</New>
-</FormTemplates>
-</file>
-
-<file path=customXml/item2.xml><?xml version="1.0" encoding="utf-8"?>
-<p:properties xmlns:p="http://schemas.microsoft.com/office/2006/metadata/properties" xmlns:xsi="http://www.w3.org/2001/XMLSchema-instance" xmlns:pc="http://schemas.microsoft.com/office/infopath/2007/PartnerControls">
-  <documentManagement>
-    <lcf76f155ced4ddcb4097134ff3c332f xmlns="d0d0097c-64f4-4e3b-99a3-bc1c796771ba">
-      <Terms xmlns="http://schemas.microsoft.com/office/infopath/2007/PartnerControls"/>
-    </lcf76f155ced4ddcb4097134ff3c332f>
-    <TaxCatchAll xmlns="a7e95da2-8946-49ae-a42c-eac0e2e49090" xsi:nil="true"/>
-  </documentManagement>
-</p:properties>
-</file>
-
-<file path=customXml/item3.xml><?xml version="1.0" encoding="utf-8"?>
 <ct:contentTypeSchema xmlns:ct="http://schemas.microsoft.com/office/2006/metadata/contentType" xmlns:ma="http://schemas.microsoft.com/office/2006/metadata/properties/metaAttributes" ct:_="" ma:_="" ma:contentTypeName="Document" ma:contentTypeID="0x010100DC58E895C404BE40B8E18D2FE0DE171E" ma:contentTypeVersion="15" ma:contentTypeDescription="Create a new document." ma:contentTypeScope="" ma:versionID="e3b50e3d3966c5dce05a9c59b7961e98">
   <xsd:schema xmlns:xsd="http://www.w3.org/2001/XMLSchema" xmlns:xs="http://www.w3.org/2001/XMLSchema" xmlns:p="http://schemas.microsoft.com/office/2006/metadata/properties" xmlns:ns2="d0d0097c-64f4-4e3b-99a3-bc1c796771ba" xmlns:ns3="a7e95da2-8946-49ae-a42c-eac0e2e49090" targetNamespace="http://schemas.microsoft.com/office/2006/metadata/properties" ma:root="true" ma:fieldsID="846743cf0710f7e7c5b0659fc053b820" ns2:_="" ns3:_="">
     <xsd:import namespace="d0d0097c-64f4-4e3b-99a3-bc1c796771ba"/>
@@ -6589,10 +6571,41 @@
 </ct:contentTypeSchema>
 </file>
 
+<file path=customXml/item2.xml><?xml version="1.0" encoding="utf-8"?>
+<p:properties xmlns:p="http://schemas.microsoft.com/office/2006/metadata/properties" xmlns:xsi="http://www.w3.org/2001/XMLSchema-instance" xmlns:pc="http://schemas.microsoft.com/office/infopath/2007/PartnerControls">
+  <documentManagement>
+    <lcf76f155ced4ddcb4097134ff3c332f xmlns="d0d0097c-64f4-4e3b-99a3-bc1c796771ba">
+      <Terms xmlns="http://schemas.microsoft.com/office/infopath/2007/PartnerControls"/>
+    </lcf76f155ced4ddcb4097134ff3c332f>
+    <TaxCatchAll xmlns="a7e95da2-8946-49ae-a42c-eac0e2e49090" xsi:nil="true"/>
+  </documentManagement>
+</p:properties>
+</file>
+
+<file path=customXml/item3.xml><?xml version="1.0" encoding="utf-8"?>
+<?mso-contentType ?>
+<FormTemplates xmlns="http://schemas.microsoft.com/sharepoint/v3/contenttype/forms">
+  <Display>DocumentLibraryForm</Display>
+  <Edit>DocumentLibraryForm</Edit>
+  <New>DocumentLibraryForm</New>
+</FormTemplates>
+</file>
+
 <file path=customXml/itemProps1.xml><?xml version="1.0" encoding="utf-8"?>
-<ds:datastoreItem xmlns:ds="http://schemas.openxmlformats.org/officeDocument/2006/customXml" ds:itemID="{3D5FAE3B-CFC5-4FC7-9790-E3F2C457D1FA}">
+<ds:datastoreItem xmlns:ds="http://schemas.openxmlformats.org/officeDocument/2006/customXml" ds:itemID="{30F31322-97E6-44DA-A806-71B0717683FF}">
   <ds:schemaRefs>
-    <ds:schemaRef ds:uri="http://schemas.microsoft.com/sharepoint/v3/contenttype/forms"/>
+    <ds:schemaRef ds:uri="http://schemas.microsoft.com/office/2006/metadata/contentType"/>
+    <ds:schemaRef ds:uri="http://schemas.microsoft.com/office/2006/metadata/properties/metaAttributes"/>
+    <ds:schemaRef ds:uri="http://www.w3.org/2001/XMLSchema"/>
+    <ds:schemaRef ds:uri="http://schemas.microsoft.com/office/2006/metadata/properties"/>
+    <ds:schemaRef ds:uri="d0d0097c-64f4-4e3b-99a3-bc1c796771ba"/>
+    <ds:schemaRef ds:uri="a7e95da2-8946-49ae-a42c-eac0e2e49090"/>
+    <ds:schemaRef ds:uri="http://schemas.microsoft.com/office/2006/documentManagement/types"/>
+    <ds:schemaRef ds:uri="http://schemas.microsoft.com/office/infopath/2007/PartnerControls"/>
+    <ds:schemaRef ds:uri="http://schemas.openxmlformats.org/package/2006/metadata/core-properties"/>
+    <ds:schemaRef ds:uri="http://purl.org/dc/elements/1.1/"/>
+    <ds:schemaRef ds:uri="http://purl.org/dc/terms/"/>
+    <ds:schemaRef ds:uri="http://schemas.microsoft.com/internal/obd"/>
   </ds:schemaRefs>
 </ds:datastoreItem>
 </file>
@@ -6609,20 +6622,9 @@
 </file>
 
 <file path=customXml/itemProps3.xml><?xml version="1.0" encoding="utf-8"?>
-<ds:datastoreItem xmlns:ds="http://schemas.openxmlformats.org/officeDocument/2006/customXml" ds:itemID="{30F31322-97E6-44DA-A806-71B0717683FF}">
+<ds:datastoreItem xmlns:ds="http://schemas.openxmlformats.org/officeDocument/2006/customXml" ds:itemID="{3D5FAE3B-CFC5-4FC7-9790-E3F2C457D1FA}">
   <ds:schemaRefs>
-    <ds:schemaRef ds:uri="http://schemas.microsoft.com/office/2006/metadata/contentType"/>
-    <ds:schemaRef ds:uri="http://schemas.microsoft.com/office/2006/metadata/properties/metaAttributes"/>
-    <ds:schemaRef ds:uri="http://www.w3.org/2001/XMLSchema"/>
-    <ds:schemaRef ds:uri="http://schemas.microsoft.com/office/2006/metadata/properties"/>
-    <ds:schemaRef ds:uri="d0d0097c-64f4-4e3b-99a3-bc1c796771ba"/>
-    <ds:schemaRef ds:uri="a7e95da2-8946-49ae-a42c-eac0e2e49090"/>
-    <ds:schemaRef ds:uri="http://schemas.microsoft.com/office/2006/documentManagement/types"/>
-    <ds:schemaRef ds:uri="http://schemas.microsoft.com/office/infopath/2007/PartnerControls"/>
-    <ds:schemaRef ds:uri="http://schemas.openxmlformats.org/package/2006/metadata/core-properties"/>
-    <ds:schemaRef ds:uri="http://purl.org/dc/elements/1.1/"/>
-    <ds:schemaRef ds:uri="http://purl.org/dc/terms/"/>
-    <ds:schemaRef ds:uri="http://schemas.microsoft.com/internal/obd"/>
+    <ds:schemaRef ds:uri="http://schemas.microsoft.com/sharepoint/v3/contenttype/forms"/>
   </ds:schemaRefs>
 </ds:datastoreItem>
 </file>
</xml_diff>